<commit_message>
Update to design and initial work on client
</commit_message>
<xml_diff>
--- a/docs/yesican Design.pptx
+++ b/docs/yesican Design.pptx
@@ -7,26 +7,27 @@
   <p:sldIdLst>
     <p:sldId id="256" r:id="rId2"/>
     <p:sldId id="258" r:id="rId3"/>
-    <p:sldId id="272" r:id="rId4"/>
-    <p:sldId id="278" r:id="rId5"/>
-    <p:sldId id="265" r:id="rId6"/>
-    <p:sldId id="266" r:id="rId7"/>
-    <p:sldId id="276" r:id="rId8"/>
-    <p:sldId id="267" r:id="rId9"/>
-    <p:sldId id="273" r:id="rId10"/>
-    <p:sldId id="268" r:id="rId11"/>
-    <p:sldId id="277" r:id="rId12"/>
-    <p:sldId id="270" r:id="rId13"/>
-    <p:sldId id="275" r:id="rId14"/>
-    <p:sldId id="274" r:id="rId15"/>
-    <p:sldId id="269" r:id="rId16"/>
-    <p:sldId id="271" r:id="rId17"/>
-    <p:sldId id="260" r:id="rId18"/>
-    <p:sldId id="261" r:id="rId19"/>
-    <p:sldId id="262" r:id="rId20"/>
-    <p:sldId id="263" r:id="rId21"/>
-    <p:sldId id="279" r:id="rId22"/>
-    <p:sldId id="280" r:id="rId23"/>
+    <p:sldId id="281" r:id="rId4"/>
+    <p:sldId id="272" r:id="rId5"/>
+    <p:sldId id="278" r:id="rId6"/>
+    <p:sldId id="265" r:id="rId7"/>
+    <p:sldId id="266" r:id="rId8"/>
+    <p:sldId id="276" r:id="rId9"/>
+    <p:sldId id="267" r:id="rId10"/>
+    <p:sldId id="273" r:id="rId11"/>
+    <p:sldId id="268" r:id="rId12"/>
+    <p:sldId id="277" r:id="rId13"/>
+    <p:sldId id="270" r:id="rId14"/>
+    <p:sldId id="275" r:id="rId15"/>
+    <p:sldId id="274" r:id="rId16"/>
+    <p:sldId id="269" r:id="rId17"/>
+    <p:sldId id="271" r:id="rId18"/>
+    <p:sldId id="260" r:id="rId19"/>
+    <p:sldId id="261" r:id="rId20"/>
+    <p:sldId id="262" r:id="rId21"/>
+    <p:sldId id="263" r:id="rId22"/>
+    <p:sldId id="279" r:id="rId23"/>
+    <p:sldId id="280" r:id="rId24"/>
   </p:sldIdLst>
   <p:sldSz cx="12192000" cy="6858000"/>
   <p:notesSz cx="6858000" cy="9144000"/>
@@ -133,7 +134,7 @@
             <a:srgbClr val="A4A3A4"/>
           </p15:clr>
         </p15:guide>
-        <p15:guide id="2" pos="1118" userDrawn="1">
+        <p15:guide id="2" pos="1663" userDrawn="1">
           <p15:clr>
             <a:srgbClr val="A4A3A4"/>
           </p15:clr>
@@ -1797,7 +1798,7 @@
           <a:p>
             <a:fld id="{A27B7B54-85DE-4AD0-A957-C586A5AD7D0F}" type="datetimeFigureOut">
               <a:rPr lang="en-GB" smtClean="0"/>
-              <a:t>25/10/2024</a:t>
+              <a:t>26/10/2024</a:t>
             </a:fld>
             <a:endParaRPr lang="en-GB"/>
           </a:p>
@@ -1995,7 +1996,7 @@
           <a:p>
             <a:fld id="{A27B7B54-85DE-4AD0-A957-C586A5AD7D0F}" type="datetimeFigureOut">
               <a:rPr lang="en-GB" smtClean="0"/>
-              <a:t>25/10/2024</a:t>
+              <a:t>26/10/2024</a:t>
             </a:fld>
             <a:endParaRPr lang="en-GB"/>
           </a:p>
@@ -2203,7 +2204,7 @@
           <a:p>
             <a:fld id="{A27B7B54-85DE-4AD0-A957-C586A5AD7D0F}" type="datetimeFigureOut">
               <a:rPr lang="en-GB" smtClean="0"/>
-              <a:t>25/10/2024</a:t>
+              <a:t>26/10/2024</a:t>
             </a:fld>
             <a:endParaRPr lang="en-GB"/>
           </a:p>
@@ -2401,7 +2402,7 @@
           <a:p>
             <a:fld id="{A27B7B54-85DE-4AD0-A957-C586A5AD7D0F}" type="datetimeFigureOut">
               <a:rPr lang="en-GB" smtClean="0"/>
-              <a:t>25/10/2024</a:t>
+              <a:t>26/10/2024</a:t>
             </a:fld>
             <a:endParaRPr lang="en-GB"/>
           </a:p>
@@ -2676,7 +2677,7 @@
           <a:p>
             <a:fld id="{A27B7B54-85DE-4AD0-A957-C586A5AD7D0F}" type="datetimeFigureOut">
               <a:rPr lang="en-GB" smtClean="0"/>
-              <a:t>25/10/2024</a:t>
+              <a:t>26/10/2024</a:t>
             </a:fld>
             <a:endParaRPr lang="en-GB"/>
           </a:p>
@@ -2941,7 +2942,7 @@
           <a:p>
             <a:fld id="{A27B7B54-85DE-4AD0-A957-C586A5AD7D0F}" type="datetimeFigureOut">
               <a:rPr lang="en-GB" smtClean="0"/>
-              <a:t>25/10/2024</a:t>
+              <a:t>26/10/2024</a:t>
             </a:fld>
             <a:endParaRPr lang="en-GB"/>
           </a:p>
@@ -3353,7 +3354,7 @@
           <a:p>
             <a:fld id="{A27B7B54-85DE-4AD0-A957-C586A5AD7D0F}" type="datetimeFigureOut">
               <a:rPr lang="en-GB" smtClean="0"/>
-              <a:t>25/10/2024</a:t>
+              <a:t>26/10/2024</a:t>
             </a:fld>
             <a:endParaRPr lang="en-GB"/>
           </a:p>
@@ -3494,7 +3495,7 @@
           <a:p>
             <a:fld id="{A27B7B54-85DE-4AD0-A957-C586A5AD7D0F}" type="datetimeFigureOut">
               <a:rPr lang="en-GB" smtClean="0"/>
-              <a:t>25/10/2024</a:t>
+              <a:t>26/10/2024</a:t>
             </a:fld>
             <a:endParaRPr lang="en-GB"/>
           </a:p>
@@ -3607,7 +3608,7 @@
           <a:p>
             <a:fld id="{A27B7B54-85DE-4AD0-A957-C586A5AD7D0F}" type="datetimeFigureOut">
               <a:rPr lang="en-GB" smtClean="0"/>
-              <a:t>25/10/2024</a:t>
+              <a:t>26/10/2024</a:t>
             </a:fld>
             <a:endParaRPr lang="en-GB"/>
           </a:p>
@@ -3918,7 +3919,7 @@
           <a:p>
             <a:fld id="{A27B7B54-85DE-4AD0-A957-C586A5AD7D0F}" type="datetimeFigureOut">
               <a:rPr lang="en-GB" smtClean="0"/>
-              <a:t>25/10/2024</a:t>
+              <a:t>26/10/2024</a:t>
             </a:fld>
             <a:endParaRPr lang="en-GB"/>
           </a:p>
@@ -4206,7 +4207,7 @@
           <a:p>
             <a:fld id="{A27B7B54-85DE-4AD0-A957-C586A5AD7D0F}" type="datetimeFigureOut">
               <a:rPr lang="en-GB" smtClean="0"/>
-              <a:t>25/10/2024</a:t>
+              <a:t>26/10/2024</a:t>
             </a:fld>
             <a:endParaRPr lang="en-GB"/>
           </a:p>
@@ -4447,7 +4448,7 @@
           <a:p>
             <a:fld id="{A27B7B54-85DE-4AD0-A957-C586A5AD7D0F}" type="datetimeFigureOut">
               <a:rPr lang="en-GB" smtClean="0"/>
-              <a:t>25/10/2024</a:t>
+              <a:t>26/10/2024</a:t>
             </a:fld>
             <a:endParaRPr lang="en-GB"/>
           </a:p>
@@ -4954,6 +4955,795 @@
         <p:cNvPr id="1" name="">
           <a:extLst>
             <a:ext uri="{FF2B5EF4-FFF2-40B4-BE49-F238E27FC236}">
+              <a16:creationId xmlns:a16="http://schemas.microsoft.com/office/drawing/2014/main" id="{B8A6577D-4491-66B2-080C-B96E9FBB7000}"/>
+            </a:ext>
+          </a:extLst>
+        </p:cNvPr>
+        <p:cNvGrpSpPr/>
+        <p:nvPr/>
+      </p:nvGrpSpPr>
+      <p:grpSpPr>
+        <a:xfrm>
+          <a:off x="0" y="0"/>
+          <a:ext cx="0" cy="0"/>
+          <a:chOff x="0" y="0"/>
+          <a:chExt cx="0" cy="0"/>
+        </a:xfrm>
+      </p:grpSpPr>
+      <p:sp>
+        <p:nvSpPr>
+          <p:cNvPr id="21" name="TextBox 20">
+            <a:extLst>
+              <a:ext uri="{FF2B5EF4-FFF2-40B4-BE49-F238E27FC236}">
+                <a16:creationId xmlns:a16="http://schemas.microsoft.com/office/drawing/2014/main" id="{94B0EAC1-91EF-B5C0-0E3F-A788F654BEEE}"/>
+              </a:ext>
+            </a:extLst>
+          </p:cNvPr>
+          <p:cNvSpPr txBox="1"/>
+          <p:nvPr/>
+        </p:nvSpPr>
+        <p:spPr>
+          <a:xfrm>
+            <a:off x="5187890" y="2725825"/>
+            <a:ext cx="1829347" cy="3785652"/>
+          </a:xfrm>
+          <a:prstGeom prst="rect">
+            <a:avLst/>
+          </a:prstGeom>
+          <a:noFill/>
+        </p:spPr>
+        <p:txBody>
+          <a:bodyPr wrap="none" rtlCol="0">
+            <a:spAutoFit/>
+          </a:bodyPr>
+          <a:lstStyle/>
+          <a:p>
+            <a:pPr algn="ctr"/>
+            <a:r>
+              <a:rPr lang="en-US" sz="24000" dirty="0">
+                <a:solidFill>
+                  <a:schemeClr val="bg1"/>
+                </a:solidFill>
+              </a:rPr>
+              <a:t>3</a:t>
+            </a:r>
+            <a:endParaRPr lang="en-GB" sz="24000" dirty="0">
+              <a:solidFill>
+                <a:schemeClr val="bg1"/>
+              </a:solidFill>
+            </a:endParaRPr>
+          </a:p>
+        </p:txBody>
+      </p:sp>
+      <p:sp>
+        <p:nvSpPr>
+          <p:cNvPr id="2" name="Oval 1">
+            <a:extLst>
+              <a:ext uri="{FF2B5EF4-FFF2-40B4-BE49-F238E27FC236}">
+                <a16:creationId xmlns:a16="http://schemas.microsoft.com/office/drawing/2014/main" id="{2DCD06B4-18B9-1C64-67DB-36C537D6BA33}"/>
+              </a:ext>
+            </a:extLst>
+          </p:cNvPr>
+          <p:cNvSpPr/>
+          <p:nvPr/>
+        </p:nvSpPr>
+        <p:spPr>
+          <a:xfrm>
+            <a:off x="1494505" y="1917038"/>
+            <a:ext cx="576000" cy="576000"/>
+          </a:xfrm>
+          <a:prstGeom prst="ellipse">
+            <a:avLst/>
+          </a:prstGeom>
+          <a:solidFill>
+            <a:srgbClr val="00FF00"/>
+          </a:solidFill>
+          <a:ln>
+            <a:noFill/>
+          </a:ln>
+        </p:spPr>
+        <p:style>
+          <a:lnRef idx="2">
+            <a:schemeClr val="accent1">
+              <a:shade val="15000"/>
+            </a:schemeClr>
+          </a:lnRef>
+          <a:fillRef idx="1">
+            <a:schemeClr val="accent1"/>
+          </a:fillRef>
+          <a:effectRef idx="0">
+            <a:schemeClr val="accent1"/>
+          </a:effectRef>
+          <a:fontRef idx="minor">
+            <a:schemeClr val="lt1"/>
+          </a:fontRef>
+        </p:style>
+        <p:txBody>
+          <a:bodyPr rtlCol="0" anchor="ctr"/>
+          <a:lstStyle/>
+          <a:p>
+            <a:pPr algn="ctr"/>
+            <a:endParaRPr lang="en-GB"/>
+          </a:p>
+        </p:txBody>
+      </p:sp>
+      <p:sp>
+        <p:nvSpPr>
+          <p:cNvPr id="3" name="TextBox 2">
+            <a:extLst>
+              <a:ext uri="{FF2B5EF4-FFF2-40B4-BE49-F238E27FC236}">
+                <a16:creationId xmlns:a16="http://schemas.microsoft.com/office/drawing/2014/main" id="{C6416EBA-B695-3115-9DD8-DEC376A5D74F}"/>
+              </a:ext>
+            </a:extLst>
+          </p:cNvPr>
+          <p:cNvSpPr txBox="1"/>
+          <p:nvPr/>
+        </p:nvSpPr>
+        <p:spPr>
+          <a:xfrm>
+            <a:off x="3863946" y="346523"/>
+            <a:ext cx="4464107" cy="707886"/>
+          </a:xfrm>
+          <a:prstGeom prst="rect">
+            <a:avLst/>
+          </a:prstGeom>
+          <a:noFill/>
+        </p:spPr>
+        <p:txBody>
+          <a:bodyPr wrap="none" rtlCol="0">
+            <a:spAutoFit/>
+          </a:bodyPr>
+          <a:lstStyle/>
+          <a:p>
+            <a:pPr algn="ctr"/>
+            <a:r>
+              <a:rPr lang="en-US" sz="4000" dirty="0">
+                <a:solidFill>
+                  <a:schemeClr val="bg1"/>
+                </a:solidFill>
+              </a:rPr>
+              <a:t>Gear Shift Indicator</a:t>
+            </a:r>
+            <a:endParaRPr lang="en-GB" sz="4000" dirty="0">
+              <a:solidFill>
+                <a:schemeClr val="bg1"/>
+              </a:solidFill>
+            </a:endParaRPr>
+          </a:p>
+        </p:txBody>
+      </p:sp>
+      <p:sp>
+        <p:nvSpPr>
+          <p:cNvPr id="4" name="Oval 3">
+            <a:extLst>
+              <a:ext uri="{FF2B5EF4-FFF2-40B4-BE49-F238E27FC236}">
+                <a16:creationId xmlns:a16="http://schemas.microsoft.com/office/drawing/2014/main" id="{4E0370DF-9810-9606-0807-BA5F6471B3B8}"/>
+              </a:ext>
+            </a:extLst>
+          </p:cNvPr>
+          <p:cNvSpPr/>
+          <p:nvPr/>
+        </p:nvSpPr>
+        <p:spPr>
+          <a:xfrm>
+            <a:off x="2358517" y="1917038"/>
+            <a:ext cx="576000" cy="576000"/>
+          </a:xfrm>
+          <a:prstGeom prst="ellipse">
+            <a:avLst/>
+          </a:prstGeom>
+          <a:solidFill>
+            <a:srgbClr val="00FF00"/>
+          </a:solidFill>
+          <a:ln>
+            <a:noFill/>
+          </a:ln>
+        </p:spPr>
+        <p:style>
+          <a:lnRef idx="2">
+            <a:schemeClr val="accent1">
+              <a:shade val="15000"/>
+            </a:schemeClr>
+          </a:lnRef>
+          <a:fillRef idx="1">
+            <a:schemeClr val="accent1"/>
+          </a:fillRef>
+          <a:effectRef idx="0">
+            <a:schemeClr val="accent1"/>
+          </a:effectRef>
+          <a:fontRef idx="minor">
+            <a:schemeClr val="lt1"/>
+          </a:fontRef>
+        </p:style>
+        <p:txBody>
+          <a:bodyPr rtlCol="0" anchor="ctr"/>
+          <a:lstStyle/>
+          <a:p>
+            <a:pPr algn="ctr"/>
+            <a:endParaRPr lang="en-GB"/>
+          </a:p>
+        </p:txBody>
+      </p:sp>
+      <p:sp>
+        <p:nvSpPr>
+          <p:cNvPr id="5" name="Oval 4">
+            <a:extLst>
+              <a:ext uri="{FF2B5EF4-FFF2-40B4-BE49-F238E27FC236}">
+                <a16:creationId xmlns:a16="http://schemas.microsoft.com/office/drawing/2014/main" id="{2C480802-F76D-8F58-C916-84E9ABDDC0BC}"/>
+              </a:ext>
+            </a:extLst>
+          </p:cNvPr>
+          <p:cNvSpPr/>
+          <p:nvPr/>
+        </p:nvSpPr>
+        <p:spPr>
+          <a:xfrm>
+            <a:off x="3222529" y="1917038"/>
+            <a:ext cx="576000" cy="576000"/>
+          </a:xfrm>
+          <a:prstGeom prst="ellipse">
+            <a:avLst/>
+          </a:prstGeom>
+          <a:solidFill>
+            <a:srgbClr val="00FF00"/>
+          </a:solidFill>
+          <a:ln>
+            <a:noFill/>
+          </a:ln>
+        </p:spPr>
+        <p:style>
+          <a:lnRef idx="2">
+            <a:schemeClr val="accent1">
+              <a:shade val="15000"/>
+            </a:schemeClr>
+          </a:lnRef>
+          <a:fillRef idx="1">
+            <a:schemeClr val="accent1"/>
+          </a:fillRef>
+          <a:effectRef idx="0">
+            <a:schemeClr val="accent1"/>
+          </a:effectRef>
+          <a:fontRef idx="minor">
+            <a:schemeClr val="lt1"/>
+          </a:fontRef>
+        </p:style>
+        <p:txBody>
+          <a:bodyPr rtlCol="0" anchor="ctr"/>
+          <a:lstStyle/>
+          <a:p>
+            <a:pPr algn="ctr"/>
+            <a:endParaRPr lang="en-GB"/>
+          </a:p>
+        </p:txBody>
+      </p:sp>
+      <p:sp>
+        <p:nvSpPr>
+          <p:cNvPr id="10" name="Oval 9">
+            <a:extLst>
+              <a:ext uri="{FF2B5EF4-FFF2-40B4-BE49-F238E27FC236}">
+                <a16:creationId xmlns:a16="http://schemas.microsoft.com/office/drawing/2014/main" id="{163E78B6-6C55-AE9E-7E1E-56E456EE025E}"/>
+              </a:ext>
+            </a:extLst>
+          </p:cNvPr>
+          <p:cNvSpPr/>
+          <p:nvPr/>
+        </p:nvSpPr>
+        <p:spPr>
+          <a:xfrm>
+            <a:off x="10132474" y="1917038"/>
+            <a:ext cx="576000" cy="576000"/>
+          </a:xfrm>
+          <a:prstGeom prst="ellipse">
+            <a:avLst/>
+          </a:prstGeom>
+          <a:solidFill>
+            <a:schemeClr val="bg1"/>
+          </a:solidFill>
+          <a:ln>
+            <a:noFill/>
+          </a:ln>
+        </p:spPr>
+        <p:style>
+          <a:lnRef idx="2">
+            <a:schemeClr val="accent1">
+              <a:shade val="15000"/>
+            </a:schemeClr>
+          </a:lnRef>
+          <a:fillRef idx="1">
+            <a:schemeClr val="accent1"/>
+          </a:fillRef>
+          <a:effectRef idx="0">
+            <a:schemeClr val="accent1"/>
+          </a:effectRef>
+          <a:fontRef idx="minor">
+            <a:schemeClr val="lt1"/>
+          </a:fontRef>
+        </p:style>
+        <p:txBody>
+          <a:bodyPr rtlCol="0" anchor="ctr"/>
+          <a:lstStyle/>
+          <a:p>
+            <a:pPr algn="ctr"/>
+            <a:endParaRPr lang="en-GB"/>
+          </a:p>
+        </p:txBody>
+      </p:sp>
+      <p:sp>
+        <p:nvSpPr>
+          <p:cNvPr id="11" name="Oval 10">
+            <a:extLst>
+              <a:ext uri="{FF2B5EF4-FFF2-40B4-BE49-F238E27FC236}">
+                <a16:creationId xmlns:a16="http://schemas.microsoft.com/office/drawing/2014/main" id="{AE9AFED8-326B-5618-2002-25CC35E19D64}"/>
+              </a:ext>
+            </a:extLst>
+          </p:cNvPr>
+          <p:cNvSpPr/>
+          <p:nvPr/>
+        </p:nvSpPr>
+        <p:spPr>
+          <a:xfrm>
+            <a:off x="9268891" y="1917038"/>
+            <a:ext cx="576000" cy="576000"/>
+          </a:xfrm>
+          <a:prstGeom prst="ellipse">
+            <a:avLst/>
+          </a:prstGeom>
+          <a:solidFill>
+            <a:schemeClr val="bg1"/>
+          </a:solidFill>
+          <a:ln>
+            <a:noFill/>
+          </a:ln>
+        </p:spPr>
+        <p:style>
+          <a:lnRef idx="2">
+            <a:schemeClr val="accent1">
+              <a:shade val="15000"/>
+            </a:schemeClr>
+          </a:lnRef>
+          <a:fillRef idx="1">
+            <a:schemeClr val="accent1"/>
+          </a:fillRef>
+          <a:effectRef idx="0">
+            <a:schemeClr val="accent1"/>
+          </a:effectRef>
+          <a:fontRef idx="minor">
+            <a:schemeClr val="lt1"/>
+          </a:fontRef>
+        </p:style>
+        <p:txBody>
+          <a:bodyPr rtlCol="0" anchor="ctr"/>
+          <a:lstStyle/>
+          <a:p>
+            <a:pPr algn="ctr"/>
+            <a:endParaRPr lang="en-GB"/>
+          </a:p>
+        </p:txBody>
+      </p:sp>
+      <p:sp>
+        <p:nvSpPr>
+          <p:cNvPr id="14" name="Oval 13">
+            <a:extLst>
+              <a:ext uri="{FF2B5EF4-FFF2-40B4-BE49-F238E27FC236}">
+                <a16:creationId xmlns:a16="http://schemas.microsoft.com/office/drawing/2014/main" id="{7B6D2D75-070A-9904-48D6-7E6532F03028}"/>
+              </a:ext>
+            </a:extLst>
+          </p:cNvPr>
+          <p:cNvSpPr/>
+          <p:nvPr/>
+        </p:nvSpPr>
+        <p:spPr>
+          <a:xfrm>
+            <a:off x="8405309" y="1917038"/>
+            <a:ext cx="576000" cy="576000"/>
+          </a:xfrm>
+          <a:prstGeom prst="ellipse">
+            <a:avLst/>
+          </a:prstGeom>
+          <a:solidFill>
+            <a:schemeClr val="bg1"/>
+          </a:solidFill>
+          <a:ln>
+            <a:noFill/>
+          </a:ln>
+        </p:spPr>
+        <p:style>
+          <a:lnRef idx="2">
+            <a:schemeClr val="accent1">
+              <a:shade val="15000"/>
+            </a:schemeClr>
+          </a:lnRef>
+          <a:fillRef idx="1">
+            <a:schemeClr val="accent1"/>
+          </a:fillRef>
+          <a:effectRef idx="0">
+            <a:schemeClr val="accent1"/>
+          </a:effectRef>
+          <a:fontRef idx="minor">
+            <a:schemeClr val="lt1"/>
+          </a:fontRef>
+        </p:style>
+        <p:txBody>
+          <a:bodyPr rtlCol="0" anchor="ctr"/>
+          <a:lstStyle/>
+          <a:p>
+            <a:pPr algn="ctr"/>
+            <a:endParaRPr lang="en-GB"/>
+          </a:p>
+        </p:txBody>
+      </p:sp>
+      <p:sp>
+        <p:nvSpPr>
+          <p:cNvPr id="15" name="Oval 14">
+            <a:extLst>
+              <a:ext uri="{FF2B5EF4-FFF2-40B4-BE49-F238E27FC236}">
+                <a16:creationId xmlns:a16="http://schemas.microsoft.com/office/drawing/2014/main" id="{3B02A47A-016E-C92C-F324-728AE994E757}"/>
+              </a:ext>
+            </a:extLst>
+          </p:cNvPr>
+          <p:cNvSpPr/>
+          <p:nvPr/>
+        </p:nvSpPr>
+        <p:spPr>
+          <a:xfrm>
+            <a:off x="7541727" y="1917038"/>
+            <a:ext cx="576000" cy="576000"/>
+          </a:xfrm>
+          <a:prstGeom prst="ellipse">
+            <a:avLst/>
+          </a:prstGeom>
+          <a:solidFill>
+            <a:schemeClr val="bg1"/>
+          </a:solidFill>
+          <a:ln>
+            <a:noFill/>
+          </a:ln>
+        </p:spPr>
+        <p:style>
+          <a:lnRef idx="2">
+            <a:schemeClr val="accent1">
+              <a:shade val="15000"/>
+            </a:schemeClr>
+          </a:lnRef>
+          <a:fillRef idx="1">
+            <a:schemeClr val="accent1"/>
+          </a:fillRef>
+          <a:effectRef idx="0">
+            <a:schemeClr val="accent1"/>
+          </a:effectRef>
+          <a:fontRef idx="minor">
+            <a:schemeClr val="lt1"/>
+          </a:fontRef>
+        </p:style>
+        <p:txBody>
+          <a:bodyPr rtlCol="0" anchor="ctr"/>
+          <a:lstStyle/>
+          <a:p>
+            <a:pPr algn="ctr"/>
+            <a:endParaRPr lang="en-GB"/>
+          </a:p>
+        </p:txBody>
+      </p:sp>
+      <p:sp>
+        <p:nvSpPr>
+          <p:cNvPr id="16" name="Oval 15">
+            <a:extLst>
+              <a:ext uri="{FF2B5EF4-FFF2-40B4-BE49-F238E27FC236}">
+                <a16:creationId xmlns:a16="http://schemas.microsoft.com/office/drawing/2014/main" id="{80A57D2D-DA27-4047-78AE-4549E17C9F79}"/>
+              </a:ext>
+            </a:extLst>
+          </p:cNvPr>
+          <p:cNvSpPr/>
+          <p:nvPr/>
+        </p:nvSpPr>
+        <p:spPr>
+          <a:xfrm>
+            <a:off x="6678145" y="1917038"/>
+            <a:ext cx="576000" cy="576000"/>
+          </a:xfrm>
+          <a:prstGeom prst="ellipse">
+            <a:avLst/>
+          </a:prstGeom>
+          <a:solidFill>
+            <a:schemeClr val="bg1"/>
+          </a:solidFill>
+          <a:ln>
+            <a:noFill/>
+          </a:ln>
+        </p:spPr>
+        <p:style>
+          <a:lnRef idx="2">
+            <a:schemeClr val="accent1">
+              <a:shade val="15000"/>
+            </a:schemeClr>
+          </a:lnRef>
+          <a:fillRef idx="1">
+            <a:schemeClr val="accent1"/>
+          </a:fillRef>
+          <a:effectRef idx="0">
+            <a:schemeClr val="accent1"/>
+          </a:effectRef>
+          <a:fontRef idx="minor">
+            <a:schemeClr val="lt1"/>
+          </a:fontRef>
+        </p:style>
+        <p:txBody>
+          <a:bodyPr rtlCol="0" anchor="ctr"/>
+          <a:lstStyle/>
+          <a:p>
+            <a:pPr algn="ctr"/>
+            <a:endParaRPr lang="en-GB"/>
+          </a:p>
+        </p:txBody>
+      </p:sp>
+      <p:sp>
+        <p:nvSpPr>
+          <p:cNvPr id="17" name="Oval 16">
+            <a:extLst>
+              <a:ext uri="{FF2B5EF4-FFF2-40B4-BE49-F238E27FC236}">
+                <a16:creationId xmlns:a16="http://schemas.microsoft.com/office/drawing/2014/main" id="{E0390D41-D0A3-D661-3D0E-960D66A78678}"/>
+              </a:ext>
+            </a:extLst>
+          </p:cNvPr>
+          <p:cNvSpPr/>
+          <p:nvPr/>
+        </p:nvSpPr>
+        <p:spPr>
+          <a:xfrm>
+            <a:off x="5814563" y="1917038"/>
+            <a:ext cx="576000" cy="576000"/>
+          </a:xfrm>
+          <a:prstGeom prst="ellipse">
+            <a:avLst/>
+          </a:prstGeom>
+          <a:solidFill>
+            <a:srgbClr val="FFFF00"/>
+          </a:solidFill>
+          <a:ln>
+            <a:noFill/>
+          </a:ln>
+        </p:spPr>
+        <p:style>
+          <a:lnRef idx="2">
+            <a:schemeClr val="accent1">
+              <a:shade val="15000"/>
+            </a:schemeClr>
+          </a:lnRef>
+          <a:fillRef idx="1">
+            <a:schemeClr val="accent1"/>
+          </a:fillRef>
+          <a:effectRef idx="0">
+            <a:schemeClr val="accent1"/>
+          </a:effectRef>
+          <a:fontRef idx="minor">
+            <a:schemeClr val="lt1"/>
+          </a:fontRef>
+        </p:style>
+        <p:txBody>
+          <a:bodyPr rtlCol="0" anchor="ctr"/>
+          <a:lstStyle/>
+          <a:p>
+            <a:pPr algn="ctr"/>
+            <a:endParaRPr lang="en-GB"/>
+          </a:p>
+        </p:txBody>
+      </p:sp>
+      <p:sp>
+        <p:nvSpPr>
+          <p:cNvPr id="18" name="Oval 17">
+            <a:extLst>
+              <a:ext uri="{FF2B5EF4-FFF2-40B4-BE49-F238E27FC236}">
+                <a16:creationId xmlns:a16="http://schemas.microsoft.com/office/drawing/2014/main" id="{A88B259F-BB93-646D-E52B-397D8C226377}"/>
+              </a:ext>
+            </a:extLst>
+          </p:cNvPr>
+          <p:cNvSpPr/>
+          <p:nvPr/>
+        </p:nvSpPr>
+        <p:spPr>
+          <a:xfrm>
+            <a:off x="4950553" y="1917038"/>
+            <a:ext cx="576000" cy="576000"/>
+          </a:xfrm>
+          <a:prstGeom prst="ellipse">
+            <a:avLst/>
+          </a:prstGeom>
+          <a:solidFill>
+            <a:srgbClr val="FFFF00"/>
+          </a:solidFill>
+          <a:ln>
+            <a:noFill/>
+          </a:ln>
+        </p:spPr>
+        <p:style>
+          <a:lnRef idx="2">
+            <a:schemeClr val="accent1">
+              <a:shade val="15000"/>
+            </a:schemeClr>
+          </a:lnRef>
+          <a:fillRef idx="1">
+            <a:schemeClr val="accent1"/>
+          </a:fillRef>
+          <a:effectRef idx="0">
+            <a:schemeClr val="accent1"/>
+          </a:effectRef>
+          <a:fontRef idx="minor">
+            <a:schemeClr val="lt1"/>
+          </a:fontRef>
+        </p:style>
+        <p:txBody>
+          <a:bodyPr rtlCol="0" anchor="ctr"/>
+          <a:lstStyle/>
+          <a:p>
+            <a:pPr algn="ctr"/>
+            <a:endParaRPr lang="en-GB"/>
+          </a:p>
+        </p:txBody>
+      </p:sp>
+      <p:sp>
+        <p:nvSpPr>
+          <p:cNvPr id="19" name="Oval 18">
+            <a:extLst>
+              <a:ext uri="{FF2B5EF4-FFF2-40B4-BE49-F238E27FC236}">
+                <a16:creationId xmlns:a16="http://schemas.microsoft.com/office/drawing/2014/main" id="{5E56FE20-CF3B-8AC1-663D-28FCCEB3EAB0}"/>
+              </a:ext>
+            </a:extLst>
+          </p:cNvPr>
+          <p:cNvSpPr/>
+          <p:nvPr/>
+        </p:nvSpPr>
+        <p:spPr>
+          <a:xfrm>
+            <a:off x="4086541" y="1917038"/>
+            <a:ext cx="576000" cy="576000"/>
+          </a:xfrm>
+          <a:prstGeom prst="ellipse">
+            <a:avLst/>
+          </a:prstGeom>
+          <a:solidFill>
+            <a:srgbClr val="00FF00"/>
+          </a:solidFill>
+          <a:ln>
+            <a:noFill/>
+          </a:ln>
+        </p:spPr>
+        <p:style>
+          <a:lnRef idx="2">
+            <a:schemeClr val="accent1">
+              <a:shade val="15000"/>
+            </a:schemeClr>
+          </a:lnRef>
+          <a:fillRef idx="1">
+            <a:schemeClr val="accent1"/>
+          </a:fillRef>
+          <a:effectRef idx="0">
+            <a:schemeClr val="accent1"/>
+          </a:effectRef>
+          <a:fontRef idx="minor">
+            <a:schemeClr val="lt1"/>
+          </a:fontRef>
+        </p:style>
+        <p:txBody>
+          <a:bodyPr rtlCol="0" anchor="ctr"/>
+          <a:lstStyle/>
+          <a:p>
+            <a:pPr algn="ctr"/>
+            <a:endParaRPr lang="en-GB"/>
+          </a:p>
+        </p:txBody>
+      </p:sp>
+      <p:sp>
+        <p:nvSpPr>
+          <p:cNvPr id="6" name="TextBox 5">
+            <a:extLst>
+              <a:ext uri="{FF2B5EF4-FFF2-40B4-BE49-F238E27FC236}">
+                <a16:creationId xmlns:a16="http://schemas.microsoft.com/office/drawing/2014/main" id="{CB5617F9-4191-F747-B2A5-AB648E2DAF47}"/>
+              </a:ext>
+            </a:extLst>
+          </p:cNvPr>
+          <p:cNvSpPr txBox="1"/>
+          <p:nvPr/>
+        </p:nvSpPr>
+        <p:spPr>
+          <a:xfrm>
+            <a:off x="414833" y="6142145"/>
+            <a:ext cx="1128835" cy="369332"/>
+          </a:xfrm>
+          <a:prstGeom prst="rect">
+            <a:avLst/>
+          </a:prstGeom>
+          <a:noFill/>
+        </p:spPr>
+        <p:txBody>
+          <a:bodyPr wrap="none" rtlCol="0">
+            <a:spAutoFit/>
+          </a:bodyPr>
+          <a:lstStyle/>
+          <a:p>
+            <a:r>
+              <a:rPr lang="en-US" dirty="0">
+                <a:solidFill>
+                  <a:schemeClr val="bg1"/>
+                </a:solidFill>
+              </a:rPr>
+              <a:t>6575 rpm</a:t>
+            </a:r>
+            <a:endParaRPr lang="en-GB" dirty="0">
+              <a:solidFill>
+                <a:schemeClr val="bg1"/>
+              </a:solidFill>
+            </a:endParaRPr>
+          </a:p>
+        </p:txBody>
+      </p:sp>
+      <p:pic>
+        <p:nvPicPr>
+          <p:cNvPr id="7" name="Graphic 6" descr="Single gear with solid fill">
+            <a:extLst>
+              <a:ext uri="{FF2B5EF4-FFF2-40B4-BE49-F238E27FC236}">
+                <a16:creationId xmlns:a16="http://schemas.microsoft.com/office/drawing/2014/main" id="{B92BA1B2-8C4E-5B11-2C81-EB1350E60B0A}"/>
+              </a:ext>
+            </a:extLst>
+          </p:cNvPr>
+          <p:cNvPicPr>
+            <a:picLocks noChangeAspect="1"/>
+          </p:cNvPicPr>
+          <p:nvPr/>
+        </p:nvPicPr>
+        <p:blipFill>
+          <a:blip r:embed="rId2">
+            <a:extLst>
+              <a:ext uri="{96DAC541-7B7A-43D3-8B79-37D633B846F1}">
+                <asvg:svgBlip xmlns:asvg="http://schemas.microsoft.com/office/drawing/2016/SVG/main" r:embed="rId3"/>
+              </a:ext>
+            </a:extLst>
+          </a:blip>
+          <a:stretch>
+            <a:fillRect/>
+          </a:stretch>
+        </p:blipFill>
+        <p:spPr>
+          <a:xfrm>
+            <a:off x="10862767" y="5684945"/>
+            <a:ext cx="914400" cy="914400"/>
+          </a:xfrm>
+          <a:prstGeom prst="rect">
+            <a:avLst/>
+          </a:prstGeom>
+        </p:spPr>
+      </p:pic>
+    </p:spTree>
+    <p:extLst>
+      <p:ext uri="{BB962C8B-B14F-4D97-AF65-F5344CB8AC3E}">
+        <p14:creationId xmlns:p14="http://schemas.microsoft.com/office/powerpoint/2010/main" val="1379629953"/>
+      </p:ext>
+    </p:extLst>
+  </p:cSld>
+  <p:clrMapOvr>
+    <a:masterClrMapping/>
+  </p:clrMapOvr>
+</p:sld>
+</file>
+
+<file path=ppt/slides/slide11.xml><?xml version="1.0" encoding="utf-8"?>
+<p:sld xmlns:a="http://schemas.openxmlformats.org/drawingml/2006/main" xmlns:r="http://schemas.openxmlformats.org/officeDocument/2006/relationships" xmlns:p="http://schemas.openxmlformats.org/presentationml/2006/main">
+  <p:cSld>
+    <p:bg>
+      <p:bgPr>
+        <a:solidFill>
+          <a:schemeClr val="tx1">
+            <a:lumMod val="65000"/>
+            <a:lumOff val="35000"/>
+          </a:schemeClr>
+        </a:solidFill>
+        <a:effectLst/>
+      </p:bgPr>
+    </p:bg>
+    <p:spTree>
+      <p:nvGrpSpPr>
+        <p:cNvPr id="1" name="">
+          <a:extLst>
+            <a:ext uri="{FF2B5EF4-FFF2-40B4-BE49-F238E27FC236}">
               <a16:creationId xmlns:a16="http://schemas.microsoft.com/office/drawing/2014/main" id="{84B4B605-EC0E-5A55-33BB-D6FFEE133D10}"/>
             </a:ext>
           </a:extLst>
@@ -5724,7 +6514,7 @@
 </p:sld>
 </file>
 
-<file path=ppt/slides/slide11.xml><?xml version="1.0" encoding="utf-8"?>
+<file path=ppt/slides/slide12.xml><?xml version="1.0" encoding="utf-8"?>
 <p:sld xmlns:a="http://schemas.openxmlformats.org/drawingml/2006/main" xmlns:r="http://schemas.openxmlformats.org/officeDocument/2006/relationships" xmlns:p="http://schemas.openxmlformats.org/presentationml/2006/main">
   <p:cSld>
     <p:bg>
@@ -6521,7 +7311,7 @@
 </p:sld>
 </file>
 
-<file path=ppt/slides/slide12.xml><?xml version="1.0" encoding="utf-8"?>
+<file path=ppt/slides/slide13.xml><?xml version="1.0" encoding="utf-8"?>
 <p:sld xmlns:a="http://schemas.openxmlformats.org/drawingml/2006/main" xmlns:r="http://schemas.openxmlformats.org/officeDocument/2006/relationships" xmlns:p="http://schemas.openxmlformats.org/presentationml/2006/main">
   <p:cSld>
     <p:bg>
@@ -7310,7 +8100,7 @@
 </p:sld>
 </file>
 
-<file path=ppt/slides/slide13.xml><?xml version="1.0" encoding="utf-8"?>
+<file path=ppt/slides/slide14.xml><?xml version="1.0" encoding="utf-8"?>
 <p:sld xmlns:a="http://schemas.openxmlformats.org/drawingml/2006/main" xmlns:r="http://schemas.openxmlformats.org/officeDocument/2006/relationships" xmlns:p="http://schemas.openxmlformats.org/presentationml/2006/main">
   <p:cSld>
     <p:bg>
@@ -8099,7 +8889,7 @@
 </p:sld>
 </file>
 
-<file path=ppt/slides/slide14.xml><?xml version="1.0" encoding="utf-8"?>
+<file path=ppt/slides/slide15.xml><?xml version="1.0" encoding="utf-8"?>
 <p:sld xmlns:a="http://schemas.openxmlformats.org/drawingml/2006/main" xmlns:r="http://schemas.openxmlformats.org/officeDocument/2006/relationships" xmlns:p="http://schemas.openxmlformats.org/presentationml/2006/main">
   <p:cSld>
     <p:bg>
@@ -8888,7 +9678,7 @@
 </p:sld>
 </file>
 
-<file path=ppt/slides/slide15.xml><?xml version="1.0" encoding="utf-8"?>
+<file path=ppt/slides/slide16.xml><?xml version="1.0" encoding="utf-8"?>
 <p:sld xmlns:a="http://schemas.openxmlformats.org/drawingml/2006/main" xmlns:r="http://schemas.openxmlformats.org/officeDocument/2006/relationships" xmlns:p="http://schemas.openxmlformats.org/presentationml/2006/main">
   <p:cSld>
     <p:bg>
@@ -10126,7 +10916,7 @@
 </p:sld>
 </file>
 
-<file path=ppt/slides/slide16.xml><?xml version="1.0" encoding="utf-8"?>
+<file path=ppt/slides/slide17.xml><?xml version="1.0" encoding="utf-8"?>
 <p:sld xmlns:a="http://schemas.openxmlformats.org/drawingml/2006/main" xmlns:r="http://schemas.openxmlformats.org/officeDocument/2006/relationships" xmlns:p="http://schemas.openxmlformats.org/presentationml/2006/main">
   <p:cSld>
     <p:bg>
@@ -10915,7 +11705,7 @@
 </p:sld>
 </file>
 
-<file path=ppt/slides/slide17.xml><?xml version="1.0" encoding="utf-8"?>
+<file path=ppt/slides/slide18.xml><?xml version="1.0" encoding="utf-8"?>
 <p:sld xmlns:a="http://schemas.openxmlformats.org/drawingml/2006/main" xmlns:r="http://schemas.openxmlformats.org/officeDocument/2006/relationships" xmlns:p="http://schemas.openxmlformats.org/presentationml/2006/main">
   <p:cSld>
     <p:bg>
@@ -11250,7 +12040,7 @@
 </p:sld>
 </file>
 
-<file path=ppt/slides/slide18.xml><?xml version="1.0" encoding="utf-8"?>
+<file path=ppt/slides/slide19.xml><?xml version="1.0" encoding="utf-8"?>
 <p:sld xmlns:a="http://schemas.openxmlformats.org/drawingml/2006/main" xmlns:r="http://schemas.openxmlformats.org/officeDocument/2006/relationships" xmlns:p="http://schemas.openxmlformats.org/presentationml/2006/main">
   <p:cSld>
     <p:bg>
@@ -11585,7 +12375,127 @@
 </p:sld>
 </file>
 
-<file path=ppt/slides/slide19.xml><?xml version="1.0" encoding="utf-8"?>
+<file path=ppt/slides/slide2.xml><?xml version="1.0" encoding="utf-8"?>
+<p:sld xmlns:a="http://schemas.openxmlformats.org/drawingml/2006/main" xmlns:r="http://schemas.openxmlformats.org/officeDocument/2006/relationships" xmlns:p="http://schemas.openxmlformats.org/presentationml/2006/main">
+  <p:cSld>
+    <p:spTree>
+      <p:nvGrpSpPr>
+        <p:cNvPr id="1" name=""/>
+        <p:cNvGrpSpPr/>
+        <p:nvPr/>
+      </p:nvGrpSpPr>
+      <p:grpSpPr>
+        <a:xfrm>
+          <a:off x="0" y="0"/>
+          <a:ext cx="0" cy="0"/>
+          <a:chOff x="0" y="0"/>
+          <a:chExt cx="0" cy="0"/>
+        </a:xfrm>
+      </p:grpSpPr>
+      <p:sp>
+        <p:nvSpPr>
+          <p:cNvPr id="2" name="Title 1">
+            <a:extLst>
+              <a:ext uri="{FF2B5EF4-FFF2-40B4-BE49-F238E27FC236}">
+                <a16:creationId xmlns:a16="http://schemas.microsoft.com/office/drawing/2014/main" id="{AE34DA84-D7CD-1F4E-F299-4C7644927B47}"/>
+              </a:ext>
+            </a:extLst>
+          </p:cNvPr>
+          <p:cNvSpPr>
+            <a:spLocks noGrp="1"/>
+          </p:cNvSpPr>
+          <p:nvPr>
+            <p:ph type="title"/>
+          </p:nvPr>
+        </p:nvSpPr>
+        <p:spPr/>
+        <p:txBody>
+          <a:bodyPr/>
+          <a:lstStyle/>
+          <a:p>
+            <a:r>
+              <a:rPr lang="en-US" dirty="0"/>
+              <a:t>Objectives</a:t>
+            </a:r>
+            <a:endParaRPr lang="en-GB" dirty="0"/>
+          </a:p>
+        </p:txBody>
+      </p:sp>
+      <p:sp>
+        <p:nvSpPr>
+          <p:cNvPr id="3" name="Content Placeholder 2">
+            <a:extLst>
+              <a:ext uri="{FF2B5EF4-FFF2-40B4-BE49-F238E27FC236}">
+                <a16:creationId xmlns:a16="http://schemas.microsoft.com/office/drawing/2014/main" id="{39A03ABF-20CA-67E8-E79A-DF91F57F8693}"/>
+              </a:ext>
+            </a:extLst>
+          </p:cNvPr>
+          <p:cNvSpPr>
+            <a:spLocks noGrp="1"/>
+          </p:cNvSpPr>
+          <p:nvPr>
+            <p:ph idx="1"/>
+          </p:nvPr>
+        </p:nvSpPr>
+        <p:spPr/>
+        <p:txBody>
+          <a:bodyPr/>
+          <a:lstStyle/>
+          <a:p>
+            <a:r>
+              <a:rPr lang="en-US" dirty="0"/>
+              <a:t>Pit speed optimizer</a:t>
+            </a:r>
+          </a:p>
+          <a:p>
+            <a:pPr lvl="1"/>
+            <a:r>
+              <a:rPr lang="en-US" dirty="0"/>
+              <a:t>Lights showing optimum speed</a:t>
+            </a:r>
+          </a:p>
+          <a:p>
+            <a:r>
+              <a:rPr lang="en-US" dirty="0"/>
+              <a:t>Gear shift indicator</a:t>
+            </a:r>
+          </a:p>
+          <a:p>
+            <a:pPr lvl="1"/>
+            <a:r>
+              <a:rPr lang="en-US" dirty="0"/>
+              <a:t>Green -&gt; Orange -&gt; Red</a:t>
+            </a:r>
+          </a:p>
+          <a:p>
+            <a:r>
+              <a:rPr lang="en-US" dirty="0"/>
+              <a:t>Pit speed limiter, if possible</a:t>
+            </a:r>
+          </a:p>
+          <a:p>
+            <a:r>
+              <a:rPr lang="en-US" dirty="0"/>
+              <a:t>Time remaining / Range in minutes – version 2</a:t>
+            </a:r>
+            <a:endParaRPr lang="en-GB" dirty="0"/>
+          </a:p>
+        </p:txBody>
+      </p:sp>
+    </p:spTree>
+    <p:extLst>
+      <p:ext uri="{BB962C8B-B14F-4D97-AF65-F5344CB8AC3E}">
+        <p14:creationId xmlns:p14="http://schemas.microsoft.com/office/powerpoint/2010/main" val="1827574467"/>
+      </p:ext>
+    </p:extLst>
+  </p:cSld>
+  <p:clrMapOvr>
+    <a:masterClrMapping/>
+  </p:clrMapOvr>
+</p:sld>
+</file>
+
+<file path=ppt/slides/slide20.xml><?xml version="1.0" encoding="utf-8"?>
 <p:sld xmlns:a="http://schemas.openxmlformats.org/drawingml/2006/main" xmlns:r="http://schemas.openxmlformats.org/officeDocument/2006/relationships" xmlns:p="http://schemas.openxmlformats.org/presentationml/2006/main">
   <p:cSld>
     <p:bg>
@@ -11868,127 +12778,7 @@
 </p:sld>
 </file>
 
-<file path=ppt/slides/slide2.xml><?xml version="1.0" encoding="utf-8"?>
-<p:sld xmlns:a="http://schemas.openxmlformats.org/drawingml/2006/main" xmlns:r="http://schemas.openxmlformats.org/officeDocument/2006/relationships" xmlns:p="http://schemas.openxmlformats.org/presentationml/2006/main">
-  <p:cSld>
-    <p:spTree>
-      <p:nvGrpSpPr>
-        <p:cNvPr id="1" name=""/>
-        <p:cNvGrpSpPr/>
-        <p:nvPr/>
-      </p:nvGrpSpPr>
-      <p:grpSpPr>
-        <a:xfrm>
-          <a:off x="0" y="0"/>
-          <a:ext cx="0" cy="0"/>
-          <a:chOff x="0" y="0"/>
-          <a:chExt cx="0" cy="0"/>
-        </a:xfrm>
-      </p:grpSpPr>
-      <p:sp>
-        <p:nvSpPr>
-          <p:cNvPr id="2" name="Title 1">
-            <a:extLst>
-              <a:ext uri="{FF2B5EF4-FFF2-40B4-BE49-F238E27FC236}">
-                <a16:creationId xmlns:a16="http://schemas.microsoft.com/office/drawing/2014/main" id="{AE34DA84-D7CD-1F4E-F299-4C7644927B47}"/>
-              </a:ext>
-            </a:extLst>
-          </p:cNvPr>
-          <p:cNvSpPr>
-            <a:spLocks noGrp="1"/>
-          </p:cNvSpPr>
-          <p:nvPr>
-            <p:ph type="title"/>
-          </p:nvPr>
-        </p:nvSpPr>
-        <p:spPr/>
-        <p:txBody>
-          <a:bodyPr/>
-          <a:lstStyle/>
-          <a:p>
-            <a:r>
-              <a:rPr lang="en-US" dirty="0"/>
-              <a:t>Objectives</a:t>
-            </a:r>
-            <a:endParaRPr lang="en-GB" dirty="0"/>
-          </a:p>
-        </p:txBody>
-      </p:sp>
-      <p:sp>
-        <p:nvSpPr>
-          <p:cNvPr id="3" name="Content Placeholder 2">
-            <a:extLst>
-              <a:ext uri="{FF2B5EF4-FFF2-40B4-BE49-F238E27FC236}">
-                <a16:creationId xmlns:a16="http://schemas.microsoft.com/office/drawing/2014/main" id="{39A03ABF-20CA-67E8-E79A-DF91F57F8693}"/>
-              </a:ext>
-            </a:extLst>
-          </p:cNvPr>
-          <p:cNvSpPr>
-            <a:spLocks noGrp="1"/>
-          </p:cNvSpPr>
-          <p:nvPr>
-            <p:ph idx="1"/>
-          </p:nvPr>
-        </p:nvSpPr>
-        <p:spPr/>
-        <p:txBody>
-          <a:bodyPr/>
-          <a:lstStyle/>
-          <a:p>
-            <a:r>
-              <a:rPr lang="en-US" dirty="0"/>
-              <a:t>Pit speed optimizer</a:t>
-            </a:r>
-          </a:p>
-          <a:p>
-            <a:pPr lvl="1"/>
-            <a:r>
-              <a:rPr lang="en-US" dirty="0"/>
-              <a:t>Lights showing optimum speed</a:t>
-            </a:r>
-          </a:p>
-          <a:p>
-            <a:r>
-              <a:rPr lang="en-US" dirty="0"/>
-              <a:t>Gear shift indicator</a:t>
-            </a:r>
-          </a:p>
-          <a:p>
-            <a:pPr lvl="1"/>
-            <a:r>
-              <a:rPr lang="en-US" dirty="0"/>
-              <a:t>Green -&gt; Orange -&gt; Red</a:t>
-            </a:r>
-          </a:p>
-          <a:p>
-            <a:r>
-              <a:rPr lang="en-US" dirty="0"/>
-              <a:t>Pit speed limiter, if possible</a:t>
-            </a:r>
-          </a:p>
-          <a:p>
-            <a:r>
-              <a:rPr lang="en-US" dirty="0"/>
-              <a:t>Time remaining / Range in minutes – version 2</a:t>
-            </a:r>
-            <a:endParaRPr lang="en-GB" dirty="0"/>
-          </a:p>
-        </p:txBody>
-      </p:sp>
-    </p:spTree>
-    <p:extLst>
-      <p:ext uri="{BB962C8B-B14F-4D97-AF65-F5344CB8AC3E}">
-        <p14:creationId xmlns:p14="http://schemas.microsoft.com/office/powerpoint/2010/main" val="1827574467"/>
-      </p:ext>
-    </p:extLst>
-  </p:cSld>
-  <p:clrMapOvr>
-    <a:masterClrMapping/>
-  </p:clrMapOvr>
-</p:sld>
-</file>
-
-<file path=ppt/slides/slide20.xml><?xml version="1.0" encoding="utf-8"?>
+<file path=ppt/slides/slide21.xml><?xml version="1.0" encoding="utf-8"?>
 <p:sld xmlns:a="http://schemas.openxmlformats.org/drawingml/2006/main" xmlns:r="http://schemas.openxmlformats.org/officeDocument/2006/relationships" xmlns:p="http://schemas.openxmlformats.org/presentationml/2006/main">
   <p:cSld>
     <p:bg>
@@ -12428,7 +13218,7 @@
 </p:sld>
 </file>
 
-<file path=ppt/slides/slide21.xml><?xml version="1.0" encoding="utf-8"?>
+<file path=ppt/slides/slide22.xml><?xml version="1.0" encoding="utf-8"?>
 <p:sld xmlns:a="http://schemas.openxmlformats.org/drawingml/2006/main" xmlns:r="http://schemas.openxmlformats.org/officeDocument/2006/relationships" xmlns:p="http://schemas.openxmlformats.org/presentationml/2006/main">
   <p:cSld>
     <p:bg>
@@ -12661,7 +13451,7 @@
 </p:sld>
 </file>
 
-<file path=ppt/slides/slide22.xml><?xml version="1.0" encoding="utf-8"?>
+<file path=ppt/slides/slide23.xml><?xml version="1.0" encoding="utf-8"?>
 <p:sld xmlns:a="http://schemas.openxmlformats.org/drawingml/2006/main" xmlns:r="http://schemas.openxmlformats.org/officeDocument/2006/relationships" xmlns:p="http://schemas.openxmlformats.org/presentationml/2006/main">
   <p:cSld>
     <p:bg>
@@ -13416,6 +14206,876 @@
 <file path=ppt/slides/slide3.xml><?xml version="1.0" encoding="utf-8"?>
 <p:sld xmlns:a="http://schemas.openxmlformats.org/drawingml/2006/main" xmlns:r="http://schemas.openxmlformats.org/officeDocument/2006/relationships" xmlns:p="http://schemas.openxmlformats.org/presentationml/2006/main">
   <p:cSld>
+    <p:spTree>
+      <p:nvGrpSpPr>
+        <p:cNvPr id="1" name=""/>
+        <p:cNvGrpSpPr/>
+        <p:nvPr/>
+      </p:nvGrpSpPr>
+      <p:grpSpPr>
+        <a:xfrm>
+          <a:off x="0" y="0"/>
+          <a:ext cx="0" cy="0"/>
+          <a:chOff x="0" y="0"/>
+          <a:chExt cx="0" cy="0"/>
+        </a:xfrm>
+      </p:grpSpPr>
+      <p:sp>
+        <p:nvSpPr>
+          <p:cNvPr id="12" name="Rectangle 11">
+            <a:extLst>
+              <a:ext uri="{FF2B5EF4-FFF2-40B4-BE49-F238E27FC236}">
+                <a16:creationId xmlns:a16="http://schemas.microsoft.com/office/drawing/2014/main" id="{D37F13D8-60E9-92FB-10CF-24C453CC081D}"/>
+              </a:ext>
+            </a:extLst>
+          </p:cNvPr>
+          <p:cNvSpPr/>
+          <p:nvPr/>
+        </p:nvSpPr>
+        <p:spPr>
+          <a:xfrm>
+            <a:off x="3335799" y="1992622"/>
+            <a:ext cx="5184000" cy="2304000"/>
+          </a:xfrm>
+          <a:prstGeom prst="rect">
+            <a:avLst/>
+          </a:prstGeom>
+          <a:solidFill>
+            <a:srgbClr val="C00000"/>
+          </a:solidFill>
+        </p:spPr>
+        <p:style>
+          <a:lnRef idx="2">
+            <a:schemeClr val="accent1">
+              <a:shade val="15000"/>
+            </a:schemeClr>
+          </a:lnRef>
+          <a:fillRef idx="1">
+            <a:schemeClr val="accent1"/>
+          </a:fillRef>
+          <a:effectRef idx="0">
+            <a:schemeClr val="accent1"/>
+          </a:effectRef>
+          <a:fontRef idx="minor">
+            <a:schemeClr val="lt1"/>
+          </a:fontRef>
+        </p:style>
+        <p:txBody>
+          <a:bodyPr rtlCol="0" anchor="t"/>
+          <a:lstStyle/>
+          <a:p>
+            <a:pPr algn="ctr"/>
+            <a:r>
+              <a:rPr lang="en-US" dirty="0">
+                <a:solidFill>
+                  <a:schemeClr val="bg1"/>
+                </a:solidFill>
+              </a:rPr>
+              <a:t>Raspberry Pi</a:t>
+            </a:r>
+            <a:endParaRPr lang="en-GB" dirty="0">
+              <a:solidFill>
+                <a:schemeClr val="bg1"/>
+              </a:solidFill>
+            </a:endParaRPr>
+          </a:p>
+        </p:txBody>
+      </p:sp>
+      <p:sp>
+        <p:nvSpPr>
+          <p:cNvPr id="2" name="Title 1">
+            <a:extLst>
+              <a:ext uri="{FF2B5EF4-FFF2-40B4-BE49-F238E27FC236}">
+                <a16:creationId xmlns:a16="http://schemas.microsoft.com/office/drawing/2014/main" id="{05BDCE03-0AA1-78DF-7057-305913F3C960}"/>
+              </a:ext>
+            </a:extLst>
+          </p:cNvPr>
+          <p:cNvSpPr>
+            <a:spLocks noGrp="1"/>
+          </p:cNvSpPr>
+          <p:nvPr>
+            <p:ph type="title"/>
+          </p:nvPr>
+        </p:nvSpPr>
+        <p:spPr/>
+        <p:txBody>
+          <a:bodyPr/>
+          <a:lstStyle/>
+          <a:p>
+            <a:r>
+              <a:rPr lang="en-US" dirty="0"/>
+              <a:t>Components</a:t>
+            </a:r>
+            <a:endParaRPr lang="en-GB" dirty="0"/>
+          </a:p>
+        </p:txBody>
+      </p:sp>
+      <p:sp>
+        <p:nvSpPr>
+          <p:cNvPr id="4" name="Rectangle 3">
+            <a:extLst>
+              <a:ext uri="{FF2B5EF4-FFF2-40B4-BE49-F238E27FC236}">
+                <a16:creationId xmlns:a16="http://schemas.microsoft.com/office/drawing/2014/main" id="{8218465E-2858-C676-7D0A-332E3A98FE8E}"/>
+              </a:ext>
+            </a:extLst>
+          </p:cNvPr>
+          <p:cNvSpPr/>
+          <p:nvPr/>
+        </p:nvSpPr>
+        <p:spPr>
+          <a:xfrm>
+            <a:off x="3638558" y="2402092"/>
+            <a:ext cx="2304000" cy="1728000"/>
+          </a:xfrm>
+          <a:prstGeom prst="rect">
+            <a:avLst/>
+          </a:prstGeom>
+          <a:noFill/>
+          <a:ln>
+            <a:solidFill>
+              <a:schemeClr val="bg1"/>
+            </a:solidFill>
+          </a:ln>
+        </p:spPr>
+        <p:style>
+          <a:lnRef idx="2">
+            <a:schemeClr val="accent1">
+              <a:shade val="15000"/>
+            </a:schemeClr>
+          </a:lnRef>
+          <a:fillRef idx="1">
+            <a:schemeClr val="accent1"/>
+          </a:fillRef>
+          <a:effectRef idx="0">
+            <a:schemeClr val="accent1"/>
+          </a:effectRef>
+          <a:fontRef idx="minor">
+            <a:schemeClr val="lt1"/>
+          </a:fontRef>
+        </p:style>
+        <p:txBody>
+          <a:bodyPr rtlCol="0" anchor="t"/>
+          <a:lstStyle/>
+          <a:p>
+            <a:pPr algn="ctr"/>
+            <a:r>
+              <a:rPr lang="en-US" dirty="0">
+                <a:solidFill>
+                  <a:schemeClr val="bg1"/>
+                </a:solidFill>
+              </a:rPr>
+              <a:t>GUI</a:t>
+            </a:r>
+          </a:p>
+          <a:p>
+            <a:pPr algn="ctr"/>
+            <a:endParaRPr lang="en-US" dirty="0">
+              <a:solidFill>
+                <a:schemeClr val="bg1"/>
+              </a:solidFill>
+            </a:endParaRPr>
+          </a:p>
+          <a:p>
+            <a:pPr algn="ctr"/>
+            <a:r>
+              <a:rPr lang="en-US" dirty="0">
+                <a:solidFill>
+                  <a:schemeClr val="bg1"/>
+                </a:solidFill>
+              </a:rPr>
+              <a:t>Responsible for presentation only</a:t>
+            </a:r>
+            <a:endParaRPr lang="en-GB" dirty="0">
+              <a:solidFill>
+                <a:schemeClr val="bg1"/>
+              </a:solidFill>
+            </a:endParaRPr>
+          </a:p>
+        </p:txBody>
+      </p:sp>
+      <p:sp>
+        <p:nvSpPr>
+          <p:cNvPr id="5" name="Rectangle 4">
+            <a:extLst>
+              <a:ext uri="{FF2B5EF4-FFF2-40B4-BE49-F238E27FC236}">
+                <a16:creationId xmlns:a16="http://schemas.microsoft.com/office/drawing/2014/main" id="{E574BBE7-F0FB-6B1C-3590-B9CC5A7A6BF1}"/>
+              </a:ext>
+            </a:extLst>
+          </p:cNvPr>
+          <p:cNvSpPr/>
+          <p:nvPr/>
+        </p:nvSpPr>
+        <p:spPr>
+          <a:xfrm>
+            <a:off x="5942558" y="2402092"/>
+            <a:ext cx="2304000" cy="1728000"/>
+          </a:xfrm>
+          <a:prstGeom prst="rect">
+            <a:avLst/>
+          </a:prstGeom>
+          <a:noFill/>
+          <a:ln>
+            <a:solidFill>
+              <a:schemeClr val="bg1"/>
+            </a:solidFill>
+          </a:ln>
+        </p:spPr>
+        <p:style>
+          <a:lnRef idx="2">
+            <a:schemeClr val="accent1">
+              <a:shade val="15000"/>
+            </a:schemeClr>
+          </a:lnRef>
+          <a:fillRef idx="1">
+            <a:schemeClr val="accent1"/>
+          </a:fillRef>
+          <a:effectRef idx="0">
+            <a:schemeClr val="accent1"/>
+          </a:effectRef>
+          <a:fontRef idx="minor">
+            <a:schemeClr val="lt1"/>
+          </a:fontRef>
+        </p:style>
+        <p:txBody>
+          <a:bodyPr rtlCol="0" anchor="t"/>
+          <a:lstStyle/>
+          <a:p>
+            <a:pPr algn="ctr"/>
+            <a:r>
+              <a:rPr lang="en-US" dirty="0">
+                <a:solidFill>
+                  <a:schemeClr val="bg1"/>
+                </a:solidFill>
+              </a:rPr>
+              <a:t>Backend</a:t>
+            </a:r>
+          </a:p>
+          <a:p>
+            <a:pPr algn="ctr"/>
+            <a:endParaRPr lang="en-US" dirty="0">
+              <a:solidFill>
+                <a:schemeClr val="bg1"/>
+              </a:solidFill>
+            </a:endParaRPr>
+          </a:p>
+          <a:p>
+            <a:pPr algn="ctr"/>
+            <a:r>
+              <a:rPr lang="en-US" dirty="0">
+                <a:solidFill>
+                  <a:schemeClr val="bg1"/>
+                </a:solidFill>
+              </a:rPr>
+              <a:t>Get’s CAN </a:t>
+            </a:r>
+            <a:r>
+              <a:rPr lang="en-US" dirty="0" err="1">
+                <a:solidFill>
+                  <a:schemeClr val="bg1"/>
+                </a:solidFill>
+              </a:rPr>
+              <a:t>msgs</a:t>
+            </a:r>
+            <a:r>
+              <a:rPr lang="en-US" dirty="0">
+                <a:solidFill>
+                  <a:schemeClr val="bg1"/>
+                </a:solidFill>
+              </a:rPr>
+              <a:t> and executes logic</a:t>
+            </a:r>
+          </a:p>
+          <a:p>
+            <a:pPr algn="ctr"/>
+            <a:endParaRPr lang="en-GB" dirty="0">
+              <a:solidFill>
+                <a:schemeClr val="bg1"/>
+              </a:solidFill>
+            </a:endParaRPr>
+          </a:p>
+        </p:txBody>
+      </p:sp>
+      <p:sp>
+        <p:nvSpPr>
+          <p:cNvPr id="6" name="Rectangle 5">
+            <a:extLst>
+              <a:ext uri="{FF2B5EF4-FFF2-40B4-BE49-F238E27FC236}">
+                <a16:creationId xmlns:a16="http://schemas.microsoft.com/office/drawing/2014/main" id="{DAE80BDF-2D3C-6F79-28D0-4433D51E01A8}"/>
+              </a:ext>
+            </a:extLst>
+          </p:cNvPr>
+          <p:cNvSpPr/>
+          <p:nvPr/>
+        </p:nvSpPr>
+        <p:spPr>
+          <a:xfrm>
+            <a:off x="8926649" y="2834092"/>
+            <a:ext cx="1728000" cy="864000"/>
+          </a:xfrm>
+          <a:prstGeom prst="rect">
+            <a:avLst/>
+          </a:prstGeom>
+          <a:noFill/>
+        </p:spPr>
+        <p:style>
+          <a:lnRef idx="2">
+            <a:schemeClr val="accent1">
+              <a:shade val="15000"/>
+            </a:schemeClr>
+          </a:lnRef>
+          <a:fillRef idx="1">
+            <a:schemeClr val="accent1"/>
+          </a:fillRef>
+          <a:effectRef idx="0">
+            <a:schemeClr val="accent1"/>
+          </a:effectRef>
+          <a:fontRef idx="minor">
+            <a:schemeClr val="lt1"/>
+          </a:fontRef>
+        </p:style>
+        <p:txBody>
+          <a:bodyPr rtlCol="0" anchor="ctr"/>
+          <a:lstStyle/>
+          <a:p>
+            <a:pPr algn="ctr"/>
+            <a:r>
+              <a:rPr lang="en-US" dirty="0">
+                <a:solidFill>
+                  <a:schemeClr val="tx1"/>
+                </a:solidFill>
+              </a:rPr>
+              <a:t>USB2CAN</a:t>
+            </a:r>
+          </a:p>
+        </p:txBody>
+      </p:sp>
+      <p:sp>
+        <p:nvSpPr>
+          <p:cNvPr id="7" name="Rectangle 6">
+            <a:extLst>
+              <a:ext uri="{FF2B5EF4-FFF2-40B4-BE49-F238E27FC236}">
+                <a16:creationId xmlns:a16="http://schemas.microsoft.com/office/drawing/2014/main" id="{3D5C834A-641C-3412-4150-EC2EADAADE04}"/>
+              </a:ext>
+            </a:extLst>
+          </p:cNvPr>
+          <p:cNvSpPr/>
+          <p:nvPr/>
+        </p:nvSpPr>
+        <p:spPr>
+          <a:xfrm>
+            <a:off x="11334740" y="2103642"/>
+            <a:ext cx="144000" cy="2304000"/>
+          </a:xfrm>
+          <a:prstGeom prst="rect">
+            <a:avLst/>
+          </a:prstGeom>
+          <a:solidFill>
+            <a:schemeClr val="tx1"/>
+          </a:solidFill>
+        </p:spPr>
+        <p:style>
+          <a:lnRef idx="2">
+            <a:schemeClr val="accent1">
+              <a:shade val="15000"/>
+            </a:schemeClr>
+          </a:lnRef>
+          <a:fillRef idx="1">
+            <a:schemeClr val="accent1"/>
+          </a:fillRef>
+          <a:effectRef idx="0">
+            <a:schemeClr val="accent1"/>
+          </a:effectRef>
+          <a:fontRef idx="minor">
+            <a:schemeClr val="lt1"/>
+          </a:fontRef>
+        </p:style>
+        <p:txBody>
+          <a:bodyPr rtlCol="0" anchor="ctr"/>
+          <a:lstStyle/>
+          <a:p>
+            <a:pPr algn="ctr"/>
+            <a:endParaRPr lang="en-US" dirty="0">
+              <a:solidFill>
+                <a:schemeClr val="tx1"/>
+              </a:solidFill>
+            </a:endParaRPr>
+          </a:p>
+        </p:txBody>
+      </p:sp>
+      <p:cxnSp>
+        <p:nvCxnSpPr>
+          <p:cNvPr id="9" name="Straight Connector 8">
+            <a:extLst>
+              <a:ext uri="{FF2B5EF4-FFF2-40B4-BE49-F238E27FC236}">
+                <a16:creationId xmlns:a16="http://schemas.microsoft.com/office/drawing/2014/main" id="{F04F207E-638C-0EB3-83E9-F97C8131399F}"/>
+              </a:ext>
+            </a:extLst>
+          </p:cNvPr>
+          <p:cNvCxnSpPr>
+            <a:cxnSpLocks/>
+            <a:endCxn id="6" idx="1"/>
+          </p:cNvCxnSpPr>
+          <p:nvPr/>
+        </p:nvCxnSpPr>
+        <p:spPr>
+          <a:xfrm>
+            <a:off x="8519799" y="3266092"/>
+            <a:ext cx="406850" cy="0"/>
+          </a:xfrm>
+          <a:prstGeom prst="line">
+            <a:avLst/>
+          </a:prstGeom>
+        </p:spPr>
+        <p:style>
+          <a:lnRef idx="2">
+            <a:schemeClr val="accent1"/>
+          </a:lnRef>
+          <a:fillRef idx="0">
+            <a:schemeClr val="accent1"/>
+          </a:fillRef>
+          <a:effectRef idx="1">
+            <a:schemeClr val="accent1"/>
+          </a:effectRef>
+          <a:fontRef idx="minor">
+            <a:schemeClr val="tx1"/>
+          </a:fontRef>
+        </p:style>
+      </p:cxnSp>
+      <p:cxnSp>
+        <p:nvCxnSpPr>
+          <p:cNvPr id="11" name="Straight Connector 10">
+            <a:extLst>
+              <a:ext uri="{FF2B5EF4-FFF2-40B4-BE49-F238E27FC236}">
+                <a16:creationId xmlns:a16="http://schemas.microsoft.com/office/drawing/2014/main" id="{D13D80B5-3B54-2679-BC9A-FF098AE0311B}"/>
+              </a:ext>
+            </a:extLst>
+          </p:cNvPr>
+          <p:cNvCxnSpPr>
+            <a:stCxn id="6" idx="3"/>
+            <a:endCxn id="7" idx="1"/>
+          </p:cNvCxnSpPr>
+          <p:nvPr/>
+        </p:nvCxnSpPr>
+        <p:spPr>
+          <a:xfrm flipV="1">
+            <a:off x="10654649" y="3255642"/>
+            <a:ext cx="680091" cy="10450"/>
+          </a:xfrm>
+          <a:prstGeom prst="line">
+            <a:avLst/>
+          </a:prstGeom>
+        </p:spPr>
+        <p:style>
+          <a:lnRef idx="2">
+            <a:schemeClr val="accent1"/>
+          </a:lnRef>
+          <a:fillRef idx="0">
+            <a:schemeClr val="accent1"/>
+          </a:fillRef>
+          <a:effectRef idx="1">
+            <a:schemeClr val="accent1"/>
+          </a:effectRef>
+          <a:fontRef idx="minor">
+            <a:schemeClr val="tx1"/>
+          </a:fontRef>
+        </p:style>
+      </p:cxnSp>
+      <p:cxnSp>
+        <p:nvCxnSpPr>
+          <p:cNvPr id="14" name="Straight Connector 13">
+            <a:extLst>
+              <a:ext uri="{FF2B5EF4-FFF2-40B4-BE49-F238E27FC236}">
+                <a16:creationId xmlns:a16="http://schemas.microsoft.com/office/drawing/2014/main" id="{653D2700-0426-8FBC-08F5-2552848612EE}"/>
+              </a:ext>
+            </a:extLst>
+          </p:cNvPr>
+          <p:cNvCxnSpPr>
+            <a:cxnSpLocks/>
+            <a:stCxn id="12" idx="2"/>
+          </p:cNvCxnSpPr>
+          <p:nvPr/>
+        </p:nvCxnSpPr>
+        <p:spPr>
+          <a:xfrm>
+            <a:off x="5927799" y="4296622"/>
+            <a:ext cx="0" cy="1189779"/>
+          </a:xfrm>
+          <a:prstGeom prst="line">
+            <a:avLst/>
+          </a:prstGeom>
+          <a:ln>
+            <a:solidFill>
+              <a:schemeClr val="tx1"/>
+            </a:solidFill>
+          </a:ln>
+        </p:spPr>
+        <p:style>
+          <a:lnRef idx="2">
+            <a:schemeClr val="accent1"/>
+          </a:lnRef>
+          <a:fillRef idx="0">
+            <a:schemeClr val="accent1"/>
+          </a:fillRef>
+          <a:effectRef idx="1">
+            <a:schemeClr val="accent1"/>
+          </a:effectRef>
+          <a:fontRef idx="minor">
+            <a:schemeClr val="tx1"/>
+          </a:fontRef>
+        </p:style>
+      </p:cxnSp>
+      <p:cxnSp>
+        <p:nvCxnSpPr>
+          <p:cNvPr id="16" name="Straight Connector 15">
+            <a:extLst>
+              <a:ext uri="{FF2B5EF4-FFF2-40B4-BE49-F238E27FC236}">
+                <a16:creationId xmlns:a16="http://schemas.microsoft.com/office/drawing/2014/main" id="{4876FE49-A479-C571-1A1E-B96B18F88DE8}"/>
+              </a:ext>
+            </a:extLst>
+          </p:cNvPr>
+          <p:cNvCxnSpPr>
+            <a:cxnSpLocks/>
+          </p:cNvCxnSpPr>
+          <p:nvPr/>
+        </p:nvCxnSpPr>
+        <p:spPr>
+          <a:xfrm flipH="1">
+            <a:off x="5526351" y="5486401"/>
+            <a:ext cx="401448" cy="0"/>
+          </a:xfrm>
+          <a:prstGeom prst="line">
+            <a:avLst/>
+          </a:prstGeom>
+          <a:ln>
+            <a:solidFill>
+              <a:schemeClr val="tx1"/>
+            </a:solidFill>
+          </a:ln>
+        </p:spPr>
+        <p:style>
+          <a:lnRef idx="2">
+            <a:schemeClr val="accent1"/>
+          </a:lnRef>
+          <a:fillRef idx="0">
+            <a:schemeClr val="accent1"/>
+          </a:fillRef>
+          <a:effectRef idx="1">
+            <a:schemeClr val="accent1"/>
+          </a:effectRef>
+          <a:fontRef idx="minor">
+            <a:schemeClr val="tx1"/>
+          </a:fontRef>
+        </p:style>
+      </p:cxnSp>
+      <p:cxnSp>
+        <p:nvCxnSpPr>
+          <p:cNvPr id="20" name="Straight Connector 19">
+            <a:extLst>
+              <a:ext uri="{FF2B5EF4-FFF2-40B4-BE49-F238E27FC236}">
+                <a16:creationId xmlns:a16="http://schemas.microsoft.com/office/drawing/2014/main" id="{47754FE2-E195-5D4B-7354-5E2EFEFACB6B}"/>
+              </a:ext>
+            </a:extLst>
+          </p:cNvPr>
+          <p:cNvCxnSpPr>
+            <a:cxnSpLocks/>
+          </p:cNvCxnSpPr>
+          <p:nvPr/>
+        </p:nvCxnSpPr>
+        <p:spPr>
+          <a:xfrm>
+            <a:off x="5054403" y="5319871"/>
+            <a:ext cx="471948" cy="166530"/>
+          </a:xfrm>
+          <a:prstGeom prst="line">
+            <a:avLst/>
+          </a:prstGeom>
+          <a:ln>
+            <a:solidFill>
+              <a:schemeClr val="tx1"/>
+            </a:solidFill>
+            <a:headEnd type="oval" w="med" len="med"/>
+            <a:tailEnd type="oval" w="med" len="med"/>
+          </a:ln>
+        </p:spPr>
+        <p:style>
+          <a:lnRef idx="2">
+            <a:schemeClr val="accent1"/>
+          </a:lnRef>
+          <a:fillRef idx="0">
+            <a:schemeClr val="accent1"/>
+          </a:fillRef>
+          <a:effectRef idx="1">
+            <a:schemeClr val="accent1"/>
+          </a:effectRef>
+          <a:fontRef idx="minor">
+            <a:schemeClr val="tx1"/>
+          </a:fontRef>
+        </p:style>
+      </p:cxnSp>
+      <p:cxnSp>
+        <p:nvCxnSpPr>
+          <p:cNvPr id="25" name="Straight Connector 24">
+            <a:extLst>
+              <a:ext uri="{FF2B5EF4-FFF2-40B4-BE49-F238E27FC236}">
+                <a16:creationId xmlns:a16="http://schemas.microsoft.com/office/drawing/2014/main" id="{E53B0B9F-E9F2-21DC-500D-3F5FFF27FD02}"/>
+              </a:ext>
+            </a:extLst>
+          </p:cNvPr>
+          <p:cNvCxnSpPr>
+            <a:cxnSpLocks/>
+          </p:cNvCxnSpPr>
+          <p:nvPr/>
+        </p:nvCxnSpPr>
+        <p:spPr>
+          <a:xfrm>
+            <a:off x="4616060" y="5274150"/>
+            <a:ext cx="476846" cy="0"/>
+          </a:xfrm>
+          <a:prstGeom prst="line">
+            <a:avLst/>
+          </a:prstGeom>
+          <a:ln>
+            <a:solidFill>
+              <a:schemeClr val="tx1"/>
+            </a:solidFill>
+          </a:ln>
+        </p:spPr>
+        <p:style>
+          <a:lnRef idx="2">
+            <a:schemeClr val="accent1"/>
+          </a:lnRef>
+          <a:fillRef idx="0">
+            <a:schemeClr val="accent1"/>
+          </a:fillRef>
+          <a:effectRef idx="1">
+            <a:schemeClr val="accent1"/>
+          </a:effectRef>
+          <a:fontRef idx="minor">
+            <a:schemeClr val="tx1"/>
+          </a:fontRef>
+        </p:style>
+      </p:cxnSp>
+      <p:cxnSp>
+        <p:nvCxnSpPr>
+          <p:cNvPr id="32" name="Straight Connector 31">
+            <a:extLst>
+              <a:ext uri="{FF2B5EF4-FFF2-40B4-BE49-F238E27FC236}">
+                <a16:creationId xmlns:a16="http://schemas.microsoft.com/office/drawing/2014/main" id="{82FE0CD6-B942-8675-B9AE-9DA207D6BA4D}"/>
+              </a:ext>
+            </a:extLst>
+          </p:cNvPr>
+          <p:cNvCxnSpPr>
+            <a:cxnSpLocks/>
+          </p:cNvCxnSpPr>
+          <p:nvPr/>
+        </p:nvCxnSpPr>
+        <p:spPr>
+          <a:xfrm flipV="1">
+            <a:off x="4614177" y="4296622"/>
+            <a:ext cx="1883" cy="966584"/>
+          </a:xfrm>
+          <a:prstGeom prst="line">
+            <a:avLst/>
+          </a:prstGeom>
+          <a:ln>
+            <a:solidFill>
+              <a:schemeClr val="tx1"/>
+            </a:solidFill>
+          </a:ln>
+        </p:spPr>
+        <p:style>
+          <a:lnRef idx="2">
+            <a:schemeClr val="accent1"/>
+          </a:lnRef>
+          <a:fillRef idx="0">
+            <a:schemeClr val="accent1"/>
+          </a:fillRef>
+          <a:effectRef idx="1">
+            <a:schemeClr val="accent1"/>
+          </a:effectRef>
+          <a:fontRef idx="minor">
+            <a:schemeClr val="tx1"/>
+          </a:fontRef>
+        </p:style>
+      </p:cxnSp>
+      <p:sp>
+        <p:nvSpPr>
+          <p:cNvPr id="34" name="TextBox 33">
+            <a:extLst>
+              <a:ext uri="{FF2B5EF4-FFF2-40B4-BE49-F238E27FC236}">
+                <a16:creationId xmlns:a16="http://schemas.microsoft.com/office/drawing/2014/main" id="{90793682-A733-E617-EC9B-D1ACD3FBD9B4}"/>
+              </a:ext>
+            </a:extLst>
+          </p:cNvPr>
+          <p:cNvSpPr txBox="1"/>
+          <p:nvPr/>
+        </p:nvSpPr>
+        <p:spPr>
+          <a:xfrm>
+            <a:off x="3638558" y="5065229"/>
+            <a:ext cx="447558" cy="369332"/>
+          </a:xfrm>
+          <a:prstGeom prst="rect">
+            <a:avLst/>
+          </a:prstGeom>
+          <a:noFill/>
+        </p:spPr>
+        <p:txBody>
+          <a:bodyPr wrap="none" rtlCol="0">
+            <a:spAutoFit/>
+          </a:bodyPr>
+          <a:lstStyle/>
+          <a:p>
+            <a:r>
+              <a:rPr lang="en-US" dirty="0"/>
+              <a:t>Pit</a:t>
+            </a:r>
+            <a:endParaRPr lang="en-GB" dirty="0"/>
+          </a:p>
+        </p:txBody>
+      </p:sp>
+      <p:sp>
+        <p:nvSpPr>
+          <p:cNvPr id="35" name="TextBox 34">
+            <a:extLst>
+              <a:ext uri="{FF2B5EF4-FFF2-40B4-BE49-F238E27FC236}">
+                <a16:creationId xmlns:a16="http://schemas.microsoft.com/office/drawing/2014/main" id="{5ED420EC-0F41-6C12-8F62-8C8823996590}"/>
+              </a:ext>
+            </a:extLst>
+          </p:cNvPr>
+          <p:cNvSpPr txBox="1"/>
+          <p:nvPr/>
+        </p:nvSpPr>
+        <p:spPr>
+          <a:xfrm>
+            <a:off x="3628908" y="5669039"/>
+            <a:ext cx="641266" cy="369332"/>
+          </a:xfrm>
+          <a:prstGeom prst="rect">
+            <a:avLst/>
+          </a:prstGeom>
+          <a:noFill/>
+        </p:spPr>
+        <p:txBody>
+          <a:bodyPr wrap="none" rtlCol="0">
+            <a:spAutoFit/>
+          </a:bodyPr>
+          <a:lstStyle/>
+          <a:p>
+            <a:r>
+              <a:rPr lang="en-US" dirty="0"/>
+              <a:t>Shift</a:t>
+            </a:r>
+            <a:endParaRPr lang="en-GB" dirty="0"/>
+          </a:p>
+        </p:txBody>
+      </p:sp>
+      <p:sp>
+        <p:nvSpPr>
+          <p:cNvPr id="37" name="Rectangle 36">
+            <a:extLst>
+              <a:ext uri="{FF2B5EF4-FFF2-40B4-BE49-F238E27FC236}">
+                <a16:creationId xmlns:a16="http://schemas.microsoft.com/office/drawing/2014/main" id="{D1942643-1212-0132-611E-CB3D1045FFE8}"/>
+              </a:ext>
+            </a:extLst>
+          </p:cNvPr>
+          <p:cNvSpPr/>
+          <p:nvPr/>
+        </p:nvSpPr>
+        <p:spPr>
+          <a:xfrm>
+            <a:off x="625034" y="2424622"/>
+            <a:ext cx="2016000" cy="1440000"/>
+          </a:xfrm>
+          <a:prstGeom prst="rect">
+            <a:avLst/>
+          </a:prstGeom>
+        </p:spPr>
+        <p:style>
+          <a:lnRef idx="2">
+            <a:schemeClr val="accent1">
+              <a:shade val="15000"/>
+            </a:schemeClr>
+          </a:lnRef>
+          <a:fillRef idx="1">
+            <a:schemeClr val="accent1"/>
+          </a:fillRef>
+          <a:effectRef idx="0">
+            <a:schemeClr val="accent1"/>
+          </a:effectRef>
+          <a:fontRef idx="minor">
+            <a:schemeClr val="lt1"/>
+          </a:fontRef>
+        </p:style>
+        <p:txBody>
+          <a:bodyPr rtlCol="0" anchor="ctr"/>
+          <a:lstStyle/>
+          <a:p>
+            <a:pPr algn="ctr"/>
+            <a:r>
+              <a:rPr lang="en-US" dirty="0"/>
+              <a:t>Display</a:t>
+            </a:r>
+            <a:endParaRPr lang="en-GB" dirty="0"/>
+          </a:p>
+        </p:txBody>
+      </p:sp>
+      <p:cxnSp>
+        <p:nvCxnSpPr>
+          <p:cNvPr id="39" name="Straight Connector 38">
+            <a:extLst>
+              <a:ext uri="{FF2B5EF4-FFF2-40B4-BE49-F238E27FC236}">
+                <a16:creationId xmlns:a16="http://schemas.microsoft.com/office/drawing/2014/main" id="{B5DA088C-2E7A-4765-4C3E-3C8E1424CDC2}"/>
+              </a:ext>
+            </a:extLst>
+          </p:cNvPr>
+          <p:cNvCxnSpPr>
+            <a:cxnSpLocks/>
+            <a:stCxn id="37" idx="3"/>
+            <a:endCxn id="12" idx="1"/>
+          </p:cNvCxnSpPr>
+          <p:nvPr/>
+        </p:nvCxnSpPr>
+        <p:spPr>
+          <a:xfrm>
+            <a:off x="2641034" y="3144622"/>
+            <a:ext cx="694765" cy="0"/>
+          </a:xfrm>
+          <a:prstGeom prst="line">
+            <a:avLst/>
+          </a:prstGeom>
+        </p:spPr>
+        <p:style>
+          <a:lnRef idx="2">
+            <a:schemeClr val="accent1"/>
+          </a:lnRef>
+          <a:fillRef idx="0">
+            <a:schemeClr val="accent1"/>
+          </a:fillRef>
+          <a:effectRef idx="1">
+            <a:schemeClr val="accent1"/>
+          </a:effectRef>
+          <a:fontRef idx="minor">
+            <a:schemeClr val="tx1"/>
+          </a:fontRef>
+        </p:style>
+      </p:cxnSp>
+    </p:spTree>
+    <p:extLst>
+      <p:ext uri="{BB962C8B-B14F-4D97-AF65-F5344CB8AC3E}">
+        <p14:creationId xmlns:p14="http://schemas.microsoft.com/office/powerpoint/2010/main" val="1606889551"/>
+      </p:ext>
+    </p:extLst>
+  </p:cSld>
+  <p:clrMapOvr>
+    <a:masterClrMapping/>
+  </p:clrMapOvr>
+</p:sld>
+</file>
+
+<file path=ppt/slides/slide4.xml><?xml version="1.0" encoding="utf-8"?>
+<p:sld xmlns:a="http://schemas.openxmlformats.org/drawingml/2006/main" xmlns:r="http://schemas.openxmlformats.org/officeDocument/2006/relationships" xmlns:p="http://schemas.openxmlformats.org/presentationml/2006/main">
+  <p:cSld>
     <p:bg>
       <p:bgPr>
         <a:solidFill>
@@ -14202,7 +15862,7 @@
 </p:sld>
 </file>
 
-<file path=ppt/slides/slide4.xml><?xml version="1.0" encoding="utf-8"?>
+<file path=ppt/slides/slide5.xml><?xml version="1.0" encoding="utf-8"?>
 <p:sld xmlns:a="http://schemas.openxmlformats.org/drawingml/2006/main" xmlns:r="http://schemas.openxmlformats.org/officeDocument/2006/relationships" xmlns:p="http://schemas.openxmlformats.org/presentationml/2006/main">
   <p:cSld>
     <p:bg>
@@ -14991,7 +16651,7 @@
 </p:sld>
 </file>
 
-<file path=ppt/slides/slide5.xml><?xml version="1.0" encoding="utf-8"?>
+<file path=ppt/slides/slide6.xml><?xml version="1.0" encoding="utf-8"?>
 <p:sld xmlns:a="http://schemas.openxmlformats.org/drawingml/2006/main" xmlns:r="http://schemas.openxmlformats.org/officeDocument/2006/relationships" xmlns:p="http://schemas.openxmlformats.org/presentationml/2006/main">
   <p:cSld>
     <p:bg>
@@ -15780,7 +17440,7 @@
 </p:sld>
 </file>
 
-<file path=ppt/slides/slide6.xml><?xml version="1.0" encoding="utf-8"?>
+<file path=ppt/slides/slide7.xml><?xml version="1.0" encoding="utf-8"?>
 <p:sld xmlns:a="http://schemas.openxmlformats.org/drawingml/2006/main" xmlns:r="http://schemas.openxmlformats.org/officeDocument/2006/relationships" xmlns:p="http://schemas.openxmlformats.org/presentationml/2006/main">
   <p:cSld>
     <p:bg>
@@ -16569,7 +18229,7 @@
 </p:sld>
 </file>
 
-<file path=ppt/slides/slide7.xml><?xml version="1.0" encoding="utf-8"?>
+<file path=ppt/slides/slide8.xml><?xml version="1.0" encoding="utf-8"?>
 <p:sld xmlns:a="http://schemas.openxmlformats.org/drawingml/2006/main" xmlns:r="http://schemas.openxmlformats.org/officeDocument/2006/relationships" xmlns:p="http://schemas.openxmlformats.org/presentationml/2006/main">
   <p:cSld>
     <p:bg>
@@ -17358,7 +19018,7 @@
 </p:sld>
 </file>
 
-<file path=ppt/slides/slide8.xml><?xml version="1.0" encoding="utf-8"?>
+<file path=ppt/slides/slide9.xml><?xml version="1.0" encoding="utf-8"?>
 <p:sld xmlns:a="http://schemas.openxmlformats.org/drawingml/2006/main" xmlns:r="http://schemas.openxmlformats.org/officeDocument/2006/relationships" xmlns:p="http://schemas.openxmlformats.org/presentationml/2006/main">
   <p:cSld>
     <p:bg>
@@ -18138,795 +19798,6 @@
     <p:extLst>
       <p:ext uri="{BB962C8B-B14F-4D97-AF65-F5344CB8AC3E}">
         <p14:creationId xmlns:p14="http://schemas.microsoft.com/office/powerpoint/2010/main" val="3674455157"/>
-      </p:ext>
-    </p:extLst>
-  </p:cSld>
-  <p:clrMapOvr>
-    <a:masterClrMapping/>
-  </p:clrMapOvr>
-</p:sld>
-</file>
-
-<file path=ppt/slides/slide9.xml><?xml version="1.0" encoding="utf-8"?>
-<p:sld xmlns:a="http://schemas.openxmlformats.org/drawingml/2006/main" xmlns:r="http://schemas.openxmlformats.org/officeDocument/2006/relationships" xmlns:p="http://schemas.openxmlformats.org/presentationml/2006/main">
-  <p:cSld>
-    <p:bg>
-      <p:bgPr>
-        <a:solidFill>
-          <a:schemeClr val="tx1">
-            <a:lumMod val="65000"/>
-            <a:lumOff val="35000"/>
-          </a:schemeClr>
-        </a:solidFill>
-        <a:effectLst/>
-      </p:bgPr>
-    </p:bg>
-    <p:spTree>
-      <p:nvGrpSpPr>
-        <p:cNvPr id="1" name="">
-          <a:extLst>
-            <a:ext uri="{FF2B5EF4-FFF2-40B4-BE49-F238E27FC236}">
-              <a16:creationId xmlns:a16="http://schemas.microsoft.com/office/drawing/2014/main" id="{B8A6577D-4491-66B2-080C-B96E9FBB7000}"/>
-            </a:ext>
-          </a:extLst>
-        </p:cNvPr>
-        <p:cNvGrpSpPr/>
-        <p:nvPr/>
-      </p:nvGrpSpPr>
-      <p:grpSpPr>
-        <a:xfrm>
-          <a:off x="0" y="0"/>
-          <a:ext cx="0" cy="0"/>
-          <a:chOff x="0" y="0"/>
-          <a:chExt cx="0" cy="0"/>
-        </a:xfrm>
-      </p:grpSpPr>
-      <p:sp>
-        <p:nvSpPr>
-          <p:cNvPr id="21" name="TextBox 20">
-            <a:extLst>
-              <a:ext uri="{FF2B5EF4-FFF2-40B4-BE49-F238E27FC236}">
-                <a16:creationId xmlns:a16="http://schemas.microsoft.com/office/drawing/2014/main" id="{94B0EAC1-91EF-B5C0-0E3F-A788F654BEEE}"/>
-              </a:ext>
-            </a:extLst>
-          </p:cNvPr>
-          <p:cNvSpPr txBox="1"/>
-          <p:nvPr/>
-        </p:nvSpPr>
-        <p:spPr>
-          <a:xfrm>
-            <a:off x="5187890" y="2725825"/>
-            <a:ext cx="1829347" cy="3785652"/>
-          </a:xfrm>
-          <a:prstGeom prst="rect">
-            <a:avLst/>
-          </a:prstGeom>
-          <a:noFill/>
-        </p:spPr>
-        <p:txBody>
-          <a:bodyPr wrap="none" rtlCol="0">
-            <a:spAutoFit/>
-          </a:bodyPr>
-          <a:lstStyle/>
-          <a:p>
-            <a:pPr algn="ctr"/>
-            <a:r>
-              <a:rPr lang="en-US" sz="24000" dirty="0">
-                <a:solidFill>
-                  <a:schemeClr val="bg1"/>
-                </a:solidFill>
-              </a:rPr>
-              <a:t>3</a:t>
-            </a:r>
-            <a:endParaRPr lang="en-GB" sz="24000" dirty="0">
-              <a:solidFill>
-                <a:schemeClr val="bg1"/>
-              </a:solidFill>
-            </a:endParaRPr>
-          </a:p>
-        </p:txBody>
-      </p:sp>
-      <p:sp>
-        <p:nvSpPr>
-          <p:cNvPr id="2" name="Oval 1">
-            <a:extLst>
-              <a:ext uri="{FF2B5EF4-FFF2-40B4-BE49-F238E27FC236}">
-                <a16:creationId xmlns:a16="http://schemas.microsoft.com/office/drawing/2014/main" id="{2DCD06B4-18B9-1C64-67DB-36C537D6BA33}"/>
-              </a:ext>
-            </a:extLst>
-          </p:cNvPr>
-          <p:cNvSpPr/>
-          <p:nvPr/>
-        </p:nvSpPr>
-        <p:spPr>
-          <a:xfrm>
-            <a:off x="1494505" y="1917038"/>
-            <a:ext cx="576000" cy="576000"/>
-          </a:xfrm>
-          <a:prstGeom prst="ellipse">
-            <a:avLst/>
-          </a:prstGeom>
-          <a:solidFill>
-            <a:srgbClr val="00FF00"/>
-          </a:solidFill>
-          <a:ln>
-            <a:noFill/>
-          </a:ln>
-        </p:spPr>
-        <p:style>
-          <a:lnRef idx="2">
-            <a:schemeClr val="accent1">
-              <a:shade val="15000"/>
-            </a:schemeClr>
-          </a:lnRef>
-          <a:fillRef idx="1">
-            <a:schemeClr val="accent1"/>
-          </a:fillRef>
-          <a:effectRef idx="0">
-            <a:schemeClr val="accent1"/>
-          </a:effectRef>
-          <a:fontRef idx="minor">
-            <a:schemeClr val="lt1"/>
-          </a:fontRef>
-        </p:style>
-        <p:txBody>
-          <a:bodyPr rtlCol="0" anchor="ctr"/>
-          <a:lstStyle/>
-          <a:p>
-            <a:pPr algn="ctr"/>
-            <a:endParaRPr lang="en-GB"/>
-          </a:p>
-        </p:txBody>
-      </p:sp>
-      <p:sp>
-        <p:nvSpPr>
-          <p:cNvPr id="3" name="TextBox 2">
-            <a:extLst>
-              <a:ext uri="{FF2B5EF4-FFF2-40B4-BE49-F238E27FC236}">
-                <a16:creationId xmlns:a16="http://schemas.microsoft.com/office/drawing/2014/main" id="{C6416EBA-B695-3115-9DD8-DEC376A5D74F}"/>
-              </a:ext>
-            </a:extLst>
-          </p:cNvPr>
-          <p:cNvSpPr txBox="1"/>
-          <p:nvPr/>
-        </p:nvSpPr>
-        <p:spPr>
-          <a:xfrm>
-            <a:off x="3863946" y="346523"/>
-            <a:ext cx="4464107" cy="707886"/>
-          </a:xfrm>
-          <a:prstGeom prst="rect">
-            <a:avLst/>
-          </a:prstGeom>
-          <a:noFill/>
-        </p:spPr>
-        <p:txBody>
-          <a:bodyPr wrap="none" rtlCol="0">
-            <a:spAutoFit/>
-          </a:bodyPr>
-          <a:lstStyle/>
-          <a:p>
-            <a:pPr algn="ctr"/>
-            <a:r>
-              <a:rPr lang="en-US" sz="4000" dirty="0">
-                <a:solidFill>
-                  <a:schemeClr val="bg1"/>
-                </a:solidFill>
-              </a:rPr>
-              <a:t>Gear Shift Indicator</a:t>
-            </a:r>
-            <a:endParaRPr lang="en-GB" sz="4000" dirty="0">
-              <a:solidFill>
-                <a:schemeClr val="bg1"/>
-              </a:solidFill>
-            </a:endParaRPr>
-          </a:p>
-        </p:txBody>
-      </p:sp>
-      <p:sp>
-        <p:nvSpPr>
-          <p:cNvPr id="4" name="Oval 3">
-            <a:extLst>
-              <a:ext uri="{FF2B5EF4-FFF2-40B4-BE49-F238E27FC236}">
-                <a16:creationId xmlns:a16="http://schemas.microsoft.com/office/drawing/2014/main" id="{4E0370DF-9810-9606-0807-BA5F6471B3B8}"/>
-              </a:ext>
-            </a:extLst>
-          </p:cNvPr>
-          <p:cNvSpPr/>
-          <p:nvPr/>
-        </p:nvSpPr>
-        <p:spPr>
-          <a:xfrm>
-            <a:off x="2358517" y="1917038"/>
-            <a:ext cx="576000" cy="576000"/>
-          </a:xfrm>
-          <a:prstGeom prst="ellipse">
-            <a:avLst/>
-          </a:prstGeom>
-          <a:solidFill>
-            <a:srgbClr val="00FF00"/>
-          </a:solidFill>
-          <a:ln>
-            <a:noFill/>
-          </a:ln>
-        </p:spPr>
-        <p:style>
-          <a:lnRef idx="2">
-            <a:schemeClr val="accent1">
-              <a:shade val="15000"/>
-            </a:schemeClr>
-          </a:lnRef>
-          <a:fillRef idx="1">
-            <a:schemeClr val="accent1"/>
-          </a:fillRef>
-          <a:effectRef idx="0">
-            <a:schemeClr val="accent1"/>
-          </a:effectRef>
-          <a:fontRef idx="minor">
-            <a:schemeClr val="lt1"/>
-          </a:fontRef>
-        </p:style>
-        <p:txBody>
-          <a:bodyPr rtlCol="0" anchor="ctr"/>
-          <a:lstStyle/>
-          <a:p>
-            <a:pPr algn="ctr"/>
-            <a:endParaRPr lang="en-GB"/>
-          </a:p>
-        </p:txBody>
-      </p:sp>
-      <p:sp>
-        <p:nvSpPr>
-          <p:cNvPr id="5" name="Oval 4">
-            <a:extLst>
-              <a:ext uri="{FF2B5EF4-FFF2-40B4-BE49-F238E27FC236}">
-                <a16:creationId xmlns:a16="http://schemas.microsoft.com/office/drawing/2014/main" id="{2C480802-F76D-8F58-C916-84E9ABDDC0BC}"/>
-              </a:ext>
-            </a:extLst>
-          </p:cNvPr>
-          <p:cNvSpPr/>
-          <p:nvPr/>
-        </p:nvSpPr>
-        <p:spPr>
-          <a:xfrm>
-            <a:off x="3222529" y="1917038"/>
-            <a:ext cx="576000" cy="576000"/>
-          </a:xfrm>
-          <a:prstGeom prst="ellipse">
-            <a:avLst/>
-          </a:prstGeom>
-          <a:solidFill>
-            <a:srgbClr val="00FF00"/>
-          </a:solidFill>
-          <a:ln>
-            <a:noFill/>
-          </a:ln>
-        </p:spPr>
-        <p:style>
-          <a:lnRef idx="2">
-            <a:schemeClr val="accent1">
-              <a:shade val="15000"/>
-            </a:schemeClr>
-          </a:lnRef>
-          <a:fillRef idx="1">
-            <a:schemeClr val="accent1"/>
-          </a:fillRef>
-          <a:effectRef idx="0">
-            <a:schemeClr val="accent1"/>
-          </a:effectRef>
-          <a:fontRef idx="minor">
-            <a:schemeClr val="lt1"/>
-          </a:fontRef>
-        </p:style>
-        <p:txBody>
-          <a:bodyPr rtlCol="0" anchor="ctr"/>
-          <a:lstStyle/>
-          <a:p>
-            <a:pPr algn="ctr"/>
-            <a:endParaRPr lang="en-GB"/>
-          </a:p>
-        </p:txBody>
-      </p:sp>
-      <p:sp>
-        <p:nvSpPr>
-          <p:cNvPr id="10" name="Oval 9">
-            <a:extLst>
-              <a:ext uri="{FF2B5EF4-FFF2-40B4-BE49-F238E27FC236}">
-                <a16:creationId xmlns:a16="http://schemas.microsoft.com/office/drawing/2014/main" id="{163E78B6-6C55-AE9E-7E1E-56E456EE025E}"/>
-              </a:ext>
-            </a:extLst>
-          </p:cNvPr>
-          <p:cNvSpPr/>
-          <p:nvPr/>
-        </p:nvSpPr>
-        <p:spPr>
-          <a:xfrm>
-            <a:off x="10132474" y="1917038"/>
-            <a:ext cx="576000" cy="576000"/>
-          </a:xfrm>
-          <a:prstGeom prst="ellipse">
-            <a:avLst/>
-          </a:prstGeom>
-          <a:solidFill>
-            <a:schemeClr val="bg1"/>
-          </a:solidFill>
-          <a:ln>
-            <a:noFill/>
-          </a:ln>
-        </p:spPr>
-        <p:style>
-          <a:lnRef idx="2">
-            <a:schemeClr val="accent1">
-              <a:shade val="15000"/>
-            </a:schemeClr>
-          </a:lnRef>
-          <a:fillRef idx="1">
-            <a:schemeClr val="accent1"/>
-          </a:fillRef>
-          <a:effectRef idx="0">
-            <a:schemeClr val="accent1"/>
-          </a:effectRef>
-          <a:fontRef idx="minor">
-            <a:schemeClr val="lt1"/>
-          </a:fontRef>
-        </p:style>
-        <p:txBody>
-          <a:bodyPr rtlCol="0" anchor="ctr"/>
-          <a:lstStyle/>
-          <a:p>
-            <a:pPr algn="ctr"/>
-            <a:endParaRPr lang="en-GB"/>
-          </a:p>
-        </p:txBody>
-      </p:sp>
-      <p:sp>
-        <p:nvSpPr>
-          <p:cNvPr id="11" name="Oval 10">
-            <a:extLst>
-              <a:ext uri="{FF2B5EF4-FFF2-40B4-BE49-F238E27FC236}">
-                <a16:creationId xmlns:a16="http://schemas.microsoft.com/office/drawing/2014/main" id="{AE9AFED8-326B-5618-2002-25CC35E19D64}"/>
-              </a:ext>
-            </a:extLst>
-          </p:cNvPr>
-          <p:cNvSpPr/>
-          <p:nvPr/>
-        </p:nvSpPr>
-        <p:spPr>
-          <a:xfrm>
-            <a:off x="9268891" y="1917038"/>
-            <a:ext cx="576000" cy="576000"/>
-          </a:xfrm>
-          <a:prstGeom prst="ellipse">
-            <a:avLst/>
-          </a:prstGeom>
-          <a:solidFill>
-            <a:schemeClr val="bg1"/>
-          </a:solidFill>
-          <a:ln>
-            <a:noFill/>
-          </a:ln>
-        </p:spPr>
-        <p:style>
-          <a:lnRef idx="2">
-            <a:schemeClr val="accent1">
-              <a:shade val="15000"/>
-            </a:schemeClr>
-          </a:lnRef>
-          <a:fillRef idx="1">
-            <a:schemeClr val="accent1"/>
-          </a:fillRef>
-          <a:effectRef idx="0">
-            <a:schemeClr val="accent1"/>
-          </a:effectRef>
-          <a:fontRef idx="minor">
-            <a:schemeClr val="lt1"/>
-          </a:fontRef>
-        </p:style>
-        <p:txBody>
-          <a:bodyPr rtlCol="0" anchor="ctr"/>
-          <a:lstStyle/>
-          <a:p>
-            <a:pPr algn="ctr"/>
-            <a:endParaRPr lang="en-GB"/>
-          </a:p>
-        </p:txBody>
-      </p:sp>
-      <p:sp>
-        <p:nvSpPr>
-          <p:cNvPr id="14" name="Oval 13">
-            <a:extLst>
-              <a:ext uri="{FF2B5EF4-FFF2-40B4-BE49-F238E27FC236}">
-                <a16:creationId xmlns:a16="http://schemas.microsoft.com/office/drawing/2014/main" id="{7B6D2D75-070A-9904-48D6-7E6532F03028}"/>
-              </a:ext>
-            </a:extLst>
-          </p:cNvPr>
-          <p:cNvSpPr/>
-          <p:nvPr/>
-        </p:nvSpPr>
-        <p:spPr>
-          <a:xfrm>
-            <a:off x="8405309" y="1917038"/>
-            <a:ext cx="576000" cy="576000"/>
-          </a:xfrm>
-          <a:prstGeom prst="ellipse">
-            <a:avLst/>
-          </a:prstGeom>
-          <a:solidFill>
-            <a:schemeClr val="bg1"/>
-          </a:solidFill>
-          <a:ln>
-            <a:noFill/>
-          </a:ln>
-        </p:spPr>
-        <p:style>
-          <a:lnRef idx="2">
-            <a:schemeClr val="accent1">
-              <a:shade val="15000"/>
-            </a:schemeClr>
-          </a:lnRef>
-          <a:fillRef idx="1">
-            <a:schemeClr val="accent1"/>
-          </a:fillRef>
-          <a:effectRef idx="0">
-            <a:schemeClr val="accent1"/>
-          </a:effectRef>
-          <a:fontRef idx="minor">
-            <a:schemeClr val="lt1"/>
-          </a:fontRef>
-        </p:style>
-        <p:txBody>
-          <a:bodyPr rtlCol="0" anchor="ctr"/>
-          <a:lstStyle/>
-          <a:p>
-            <a:pPr algn="ctr"/>
-            <a:endParaRPr lang="en-GB"/>
-          </a:p>
-        </p:txBody>
-      </p:sp>
-      <p:sp>
-        <p:nvSpPr>
-          <p:cNvPr id="15" name="Oval 14">
-            <a:extLst>
-              <a:ext uri="{FF2B5EF4-FFF2-40B4-BE49-F238E27FC236}">
-                <a16:creationId xmlns:a16="http://schemas.microsoft.com/office/drawing/2014/main" id="{3B02A47A-016E-C92C-F324-728AE994E757}"/>
-              </a:ext>
-            </a:extLst>
-          </p:cNvPr>
-          <p:cNvSpPr/>
-          <p:nvPr/>
-        </p:nvSpPr>
-        <p:spPr>
-          <a:xfrm>
-            <a:off x="7541727" y="1917038"/>
-            <a:ext cx="576000" cy="576000"/>
-          </a:xfrm>
-          <a:prstGeom prst="ellipse">
-            <a:avLst/>
-          </a:prstGeom>
-          <a:solidFill>
-            <a:schemeClr val="bg1"/>
-          </a:solidFill>
-          <a:ln>
-            <a:noFill/>
-          </a:ln>
-        </p:spPr>
-        <p:style>
-          <a:lnRef idx="2">
-            <a:schemeClr val="accent1">
-              <a:shade val="15000"/>
-            </a:schemeClr>
-          </a:lnRef>
-          <a:fillRef idx="1">
-            <a:schemeClr val="accent1"/>
-          </a:fillRef>
-          <a:effectRef idx="0">
-            <a:schemeClr val="accent1"/>
-          </a:effectRef>
-          <a:fontRef idx="minor">
-            <a:schemeClr val="lt1"/>
-          </a:fontRef>
-        </p:style>
-        <p:txBody>
-          <a:bodyPr rtlCol="0" anchor="ctr"/>
-          <a:lstStyle/>
-          <a:p>
-            <a:pPr algn="ctr"/>
-            <a:endParaRPr lang="en-GB"/>
-          </a:p>
-        </p:txBody>
-      </p:sp>
-      <p:sp>
-        <p:nvSpPr>
-          <p:cNvPr id="16" name="Oval 15">
-            <a:extLst>
-              <a:ext uri="{FF2B5EF4-FFF2-40B4-BE49-F238E27FC236}">
-                <a16:creationId xmlns:a16="http://schemas.microsoft.com/office/drawing/2014/main" id="{80A57D2D-DA27-4047-78AE-4549E17C9F79}"/>
-              </a:ext>
-            </a:extLst>
-          </p:cNvPr>
-          <p:cNvSpPr/>
-          <p:nvPr/>
-        </p:nvSpPr>
-        <p:spPr>
-          <a:xfrm>
-            <a:off x="6678145" y="1917038"/>
-            <a:ext cx="576000" cy="576000"/>
-          </a:xfrm>
-          <a:prstGeom prst="ellipse">
-            <a:avLst/>
-          </a:prstGeom>
-          <a:solidFill>
-            <a:schemeClr val="bg1"/>
-          </a:solidFill>
-          <a:ln>
-            <a:noFill/>
-          </a:ln>
-        </p:spPr>
-        <p:style>
-          <a:lnRef idx="2">
-            <a:schemeClr val="accent1">
-              <a:shade val="15000"/>
-            </a:schemeClr>
-          </a:lnRef>
-          <a:fillRef idx="1">
-            <a:schemeClr val="accent1"/>
-          </a:fillRef>
-          <a:effectRef idx="0">
-            <a:schemeClr val="accent1"/>
-          </a:effectRef>
-          <a:fontRef idx="minor">
-            <a:schemeClr val="lt1"/>
-          </a:fontRef>
-        </p:style>
-        <p:txBody>
-          <a:bodyPr rtlCol="0" anchor="ctr"/>
-          <a:lstStyle/>
-          <a:p>
-            <a:pPr algn="ctr"/>
-            <a:endParaRPr lang="en-GB"/>
-          </a:p>
-        </p:txBody>
-      </p:sp>
-      <p:sp>
-        <p:nvSpPr>
-          <p:cNvPr id="17" name="Oval 16">
-            <a:extLst>
-              <a:ext uri="{FF2B5EF4-FFF2-40B4-BE49-F238E27FC236}">
-                <a16:creationId xmlns:a16="http://schemas.microsoft.com/office/drawing/2014/main" id="{E0390D41-D0A3-D661-3D0E-960D66A78678}"/>
-              </a:ext>
-            </a:extLst>
-          </p:cNvPr>
-          <p:cNvSpPr/>
-          <p:nvPr/>
-        </p:nvSpPr>
-        <p:spPr>
-          <a:xfrm>
-            <a:off x="5814563" y="1917038"/>
-            <a:ext cx="576000" cy="576000"/>
-          </a:xfrm>
-          <a:prstGeom prst="ellipse">
-            <a:avLst/>
-          </a:prstGeom>
-          <a:solidFill>
-            <a:srgbClr val="FFFF00"/>
-          </a:solidFill>
-          <a:ln>
-            <a:noFill/>
-          </a:ln>
-        </p:spPr>
-        <p:style>
-          <a:lnRef idx="2">
-            <a:schemeClr val="accent1">
-              <a:shade val="15000"/>
-            </a:schemeClr>
-          </a:lnRef>
-          <a:fillRef idx="1">
-            <a:schemeClr val="accent1"/>
-          </a:fillRef>
-          <a:effectRef idx="0">
-            <a:schemeClr val="accent1"/>
-          </a:effectRef>
-          <a:fontRef idx="minor">
-            <a:schemeClr val="lt1"/>
-          </a:fontRef>
-        </p:style>
-        <p:txBody>
-          <a:bodyPr rtlCol="0" anchor="ctr"/>
-          <a:lstStyle/>
-          <a:p>
-            <a:pPr algn="ctr"/>
-            <a:endParaRPr lang="en-GB"/>
-          </a:p>
-        </p:txBody>
-      </p:sp>
-      <p:sp>
-        <p:nvSpPr>
-          <p:cNvPr id="18" name="Oval 17">
-            <a:extLst>
-              <a:ext uri="{FF2B5EF4-FFF2-40B4-BE49-F238E27FC236}">
-                <a16:creationId xmlns:a16="http://schemas.microsoft.com/office/drawing/2014/main" id="{A88B259F-BB93-646D-E52B-397D8C226377}"/>
-              </a:ext>
-            </a:extLst>
-          </p:cNvPr>
-          <p:cNvSpPr/>
-          <p:nvPr/>
-        </p:nvSpPr>
-        <p:spPr>
-          <a:xfrm>
-            <a:off x="4950553" y="1917038"/>
-            <a:ext cx="576000" cy="576000"/>
-          </a:xfrm>
-          <a:prstGeom prst="ellipse">
-            <a:avLst/>
-          </a:prstGeom>
-          <a:solidFill>
-            <a:srgbClr val="FFFF00"/>
-          </a:solidFill>
-          <a:ln>
-            <a:noFill/>
-          </a:ln>
-        </p:spPr>
-        <p:style>
-          <a:lnRef idx="2">
-            <a:schemeClr val="accent1">
-              <a:shade val="15000"/>
-            </a:schemeClr>
-          </a:lnRef>
-          <a:fillRef idx="1">
-            <a:schemeClr val="accent1"/>
-          </a:fillRef>
-          <a:effectRef idx="0">
-            <a:schemeClr val="accent1"/>
-          </a:effectRef>
-          <a:fontRef idx="minor">
-            <a:schemeClr val="lt1"/>
-          </a:fontRef>
-        </p:style>
-        <p:txBody>
-          <a:bodyPr rtlCol="0" anchor="ctr"/>
-          <a:lstStyle/>
-          <a:p>
-            <a:pPr algn="ctr"/>
-            <a:endParaRPr lang="en-GB"/>
-          </a:p>
-        </p:txBody>
-      </p:sp>
-      <p:sp>
-        <p:nvSpPr>
-          <p:cNvPr id="19" name="Oval 18">
-            <a:extLst>
-              <a:ext uri="{FF2B5EF4-FFF2-40B4-BE49-F238E27FC236}">
-                <a16:creationId xmlns:a16="http://schemas.microsoft.com/office/drawing/2014/main" id="{5E56FE20-CF3B-8AC1-663D-28FCCEB3EAB0}"/>
-              </a:ext>
-            </a:extLst>
-          </p:cNvPr>
-          <p:cNvSpPr/>
-          <p:nvPr/>
-        </p:nvSpPr>
-        <p:spPr>
-          <a:xfrm>
-            <a:off x="4086541" y="1917038"/>
-            <a:ext cx="576000" cy="576000"/>
-          </a:xfrm>
-          <a:prstGeom prst="ellipse">
-            <a:avLst/>
-          </a:prstGeom>
-          <a:solidFill>
-            <a:srgbClr val="00FF00"/>
-          </a:solidFill>
-          <a:ln>
-            <a:noFill/>
-          </a:ln>
-        </p:spPr>
-        <p:style>
-          <a:lnRef idx="2">
-            <a:schemeClr val="accent1">
-              <a:shade val="15000"/>
-            </a:schemeClr>
-          </a:lnRef>
-          <a:fillRef idx="1">
-            <a:schemeClr val="accent1"/>
-          </a:fillRef>
-          <a:effectRef idx="0">
-            <a:schemeClr val="accent1"/>
-          </a:effectRef>
-          <a:fontRef idx="minor">
-            <a:schemeClr val="lt1"/>
-          </a:fontRef>
-        </p:style>
-        <p:txBody>
-          <a:bodyPr rtlCol="0" anchor="ctr"/>
-          <a:lstStyle/>
-          <a:p>
-            <a:pPr algn="ctr"/>
-            <a:endParaRPr lang="en-GB"/>
-          </a:p>
-        </p:txBody>
-      </p:sp>
-      <p:sp>
-        <p:nvSpPr>
-          <p:cNvPr id="6" name="TextBox 5">
-            <a:extLst>
-              <a:ext uri="{FF2B5EF4-FFF2-40B4-BE49-F238E27FC236}">
-                <a16:creationId xmlns:a16="http://schemas.microsoft.com/office/drawing/2014/main" id="{CB5617F9-4191-F747-B2A5-AB648E2DAF47}"/>
-              </a:ext>
-            </a:extLst>
-          </p:cNvPr>
-          <p:cNvSpPr txBox="1"/>
-          <p:nvPr/>
-        </p:nvSpPr>
-        <p:spPr>
-          <a:xfrm>
-            <a:off x="414833" y="6142145"/>
-            <a:ext cx="1128835" cy="369332"/>
-          </a:xfrm>
-          <a:prstGeom prst="rect">
-            <a:avLst/>
-          </a:prstGeom>
-          <a:noFill/>
-        </p:spPr>
-        <p:txBody>
-          <a:bodyPr wrap="none" rtlCol="0">
-            <a:spAutoFit/>
-          </a:bodyPr>
-          <a:lstStyle/>
-          <a:p>
-            <a:r>
-              <a:rPr lang="en-US" dirty="0">
-                <a:solidFill>
-                  <a:schemeClr val="bg1"/>
-                </a:solidFill>
-              </a:rPr>
-              <a:t>6575 rpm</a:t>
-            </a:r>
-            <a:endParaRPr lang="en-GB" dirty="0">
-              <a:solidFill>
-                <a:schemeClr val="bg1"/>
-              </a:solidFill>
-            </a:endParaRPr>
-          </a:p>
-        </p:txBody>
-      </p:sp>
-      <p:pic>
-        <p:nvPicPr>
-          <p:cNvPr id="7" name="Graphic 6" descr="Single gear with solid fill">
-            <a:extLst>
-              <a:ext uri="{FF2B5EF4-FFF2-40B4-BE49-F238E27FC236}">
-                <a16:creationId xmlns:a16="http://schemas.microsoft.com/office/drawing/2014/main" id="{B92BA1B2-8C4E-5B11-2C81-EB1350E60B0A}"/>
-              </a:ext>
-            </a:extLst>
-          </p:cNvPr>
-          <p:cNvPicPr>
-            <a:picLocks noChangeAspect="1"/>
-          </p:cNvPicPr>
-          <p:nvPr/>
-        </p:nvPicPr>
-        <p:blipFill>
-          <a:blip r:embed="rId2">
-            <a:extLst>
-              <a:ext uri="{96DAC541-7B7A-43D3-8B79-37D633B846F1}">
-                <asvg:svgBlip xmlns:asvg="http://schemas.microsoft.com/office/drawing/2016/SVG/main" r:embed="rId3"/>
-              </a:ext>
-            </a:extLst>
-          </a:blip>
-          <a:stretch>
-            <a:fillRect/>
-          </a:stretch>
-        </p:blipFill>
-        <p:spPr>
-          <a:xfrm>
-            <a:off x="10862767" y="5684945"/>
-            <a:ext cx="914400" cy="914400"/>
-          </a:xfrm>
-          <a:prstGeom prst="rect">
-            <a:avLst/>
-          </a:prstGeom>
-        </p:spPr>
-      </p:pic>
-    </p:spTree>
-    <p:extLst>
-      <p:ext uri="{BB962C8B-B14F-4D97-AF65-F5344CB8AC3E}">
-        <p14:creationId xmlns:p14="http://schemas.microsoft.com/office/powerpoint/2010/main" val="1379629953"/>
       </p:ext>
     </p:extLst>
   </p:cSld>

</xml_diff>